<commit_message>
Added final version of presentation. Hopefully no more changes after this draft.
</commit_message>
<xml_diff>
--- a/doc/publications/ches2016/ches2016-antikernel-2.pptx
+++ b/doc/publications/ches2016/ches2016-antikernel-2.pptx
@@ -5,32 +5,33 @@
     <p:sldMasterId id="2147483656" r:id="rId1"/>
   </p:sldMasterIdLst>
   <p:notesMasterIdLst>
-    <p:notesMasterId r:id="rId25"/>
+    <p:notesMasterId r:id="rId26"/>
   </p:notesMasterIdLst>
   <p:sldIdLst>
     <p:sldId id="263" r:id="rId2"/>
     <p:sldId id="340" r:id="rId3"/>
     <p:sldId id="339" r:id="rId4"/>
     <p:sldId id="341" r:id="rId5"/>
-    <p:sldId id="342" r:id="rId6"/>
-    <p:sldId id="343" r:id="rId7"/>
-    <p:sldId id="344" r:id="rId8"/>
-    <p:sldId id="354" r:id="rId9"/>
-    <p:sldId id="346" r:id="rId10"/>
-    <p:sldId id="327" r:id="rId11"/>
-    <p:sldId id="353" r:id="rId12"/>
-    <p:sldId id="345" r:id="rId13"/>
-    <p:sldId id="347" r:id="rId14"/>
-    <p:sldId id="348" r:id="rId15"/>
-    <p:sldId id="349" r:id="rId16"/>
-    <p:sldId id="350" r:id="rId17"/>
-    <p:sldId id="334" r:id="rId18"/>
-    <p:sldId id="355" r:id="rId19"/>
-    <p:sldId id="336" r:id="rId20"/>
-    <p:sldId id="352" r:id="rId21"/>
-    <p:sldId id="335" r:id="rId22"/>
-    <p:sldId id="351" r:id="rId23"/>
-    <p:sldId id="296" r:id="rId24"/>
+    <p:sldId id="356" r:id="rId6"/>
+    <p:sldId id="342" r:id="rId7"/>
+    <p:sldId id="343" r:id="rId8"/>
+    <p:sldId id="344" r:id="rId9"/>
+    <p:sldId id="354" r:id="rId10"/>
+    <p:sldId id="346" r:id="rId11"/>
+    <p:sldId id="327" r:id="rId12"/>
+    <p:sldId id="353" r:id="rId13"/>
+    <p:sldId id="345" r:id="rId14"/>
+    <p:sldId id="347" r:id="rId15"/>
+    <p:sldId id="348" r:id="rId16"/>
+    <p:sldId id="349" r:id="rId17"/>
+    <p:sldId id="350" r:id="rId18"/>
+    <p:sldId id="334" r:id="rId19"/>
+    <p:sldId id="355" r:id="rId20"/>
+    <p:sldId id="336" r:id="rId21"/>
+    <p:sldId id="352" r:id="rId22"/>
+    <p:sldId id="335" r:id="rId23"/>
+    <p:sldId id="351" r:id="rId24"/>
+    <p:sldId id="296" r:id="rId25"/>
   </p:sldIdLst>
   <p:sldSz cx="9144000" cy="5143500" type="screen16x9"/>
   <p:notesSz cx="6858000" cy="9144000"/>
@@ -4488,7 +4489,7 @@
           <a:p>
             <a:r>
               <a:rPr lang="en-US" dirty="0" smtClean="0"/>
-              <a:t>Communication</a:t>
+              <a:t>Access to hardware</a:t>
             </a:r>
             <a:endParaRPr lang="en-US" dirty="0"/>
           </a:p>
@@ -4511,103 +4512,557 @@
           <a:p>
             <a:r>
               <a:rPr lang="en-US" dirty="0" smtClean="0"/>
-              <a:t>Two parallel networks</a:t>
-            </a:r>
+              <a:t>Instead of a bus, connect the CPU to rest of the </a:t>
+            </a:r>
+            <a:r>
+              <a:rPr lang="en-US" dirty="0" err="1" smtClean="0"/>
+              <a:t>SoC</a:t>
+            </a:r>
+            <a:r>
+              <a:rPr lang="en-US" dirty="0" smtClean="0"/>
+              <a:t> with a packet-switched </a:t>
+            </a:r>
+            <a:r>
+              <a:rPr lang="en-US" dirty="0" err="1" smtClean="0"/>
+              <a:t>NoC</a:t>
+            </a:r>
+            <a:endParaRPr lang="en-US" dirty="0" smtClean="0"/>
           </a:p>
           <a:p>
             <a:pPr lvl="1"/>
             <a:r>
               <a:rPr lang="en-US" dirty="0" smtClean="0"/>
-              <a:t>RPC network: 4x 32 bit </a:t>
-            </a:r>
-            <a:r>
-              <a:rPr lang="en-US" dirty="0" smtClean="0"/>
-              <a:t>words, ≈ </a:t>
+              <a:t>Assign addresses as</a:t>
+            </a:r>
+            <a:r>
+              <a:rPr lang="en-US" dirty="0" smtClean="0"/>
+              <a:t> {</a:t>
             </a:r>
             <a:r>
               <a:rPr lang="en-US" dirty="0" err="1" smtClean="0"/>
-              <a:t>ioctl</a:t>
-            </a:r>
-            <a:r>
-              <a:rPr lang="en-US" dirty="0" smtClean="0"/>
-              <a:t>(2)</a:t>
-            </a:r>
-            <a:r>
-              <a:rPr lang="en-US" dirty="0" smtClean="0"/>
-              <a:t/>
-            </a:r>
-            <a:br>
-              <a:rPr lang="en-US" dirty="0" smtClean="0"/>
-            </a:br>
-            <a:r>
-              <a:rPr lang="en-US" dirty="0" smtClean="0"/>
-              <a:t>Typically accessed via CPU registers for low latency</a:t>
-            </a:r>
-          </a:p>
-          <a:p>
-            <a:pPr lvl="1"/>
-            <a:r>
-              <a:rPr lang="en-US" dirty="0" smtClean="0"/>
-              <a:t>DMA network: 1-512 word data plane blocks</a:t>
-            </a:r>
-            <a:r>
-              <a:rPr lang="en-US" dirty="0"/>
-              <a:t/>
-            </a:r>
-            <a:br>
-              <a:rPr lang="en-US" dirty="0"/>
-            </a:br>
-            <a:r>
-              <a:rPr lang="en-US" dirty="0" smtClean="0"/>
-              <a:t>Typically memory mapped</a:t>
-            </a:r>
-          </a:p>
-          <a:p>
-            <a:r>
-              <a:rPr lang="en-US" dirty="0" smtClean="0"/>
-              <a:t>Reliable datagrams</a:t>
-            </a:r>
-          </a:p>
-          <a:p>
-            <a:pPr lvl="1"/>
-            <a:r>
-              <a:rPr lang="en-US" dirty="0" smtClean="0"/>
-              <a:t>In-order delivery between any pair of endpoints</a:t>
-            </a:r>
-          </a:p>
-          <a:p>
-            <a:pPr lvl="1"/>
-            <a:r>
-              <a:rPr lang="en-US" dirty="0" smtClean="0"/>
-              <a:t>Guaranteed </a:t>
-            </a:r>
-            <a:r>
-              <a:rPr lang="en-US" dirty="0" smtClean="0"/>
-              <a:t>minimum </a:t>
-            </a:r>
+              <a:t>cpu</a:t>
+            </a:r>
+            <a:r>
+              <a:rPr lang="en-US" dirty="0" smtClean="0"/>
+              <a:t> </a:t>
+            </a:r>
+            <a:r>
+              <a:rPr lang="en-US" dirty="0" smtClean="0"/>
+              <a:t>subnet prefix</a:t>
+            </a:r>
+            <a:r>
+              <a:rPr lang="en-US" dirty="0" smtClean="0"/>
+              <a:t>, </a:t>
+            </a:r>
+            <a:r>
+              <a:rPr lang="en-US" dirty="0" smtClean="0"/>
+              <a:t>PID}</a:t>
+            </a:r>
+            <a:endParaRPr lang="en-US" dirty="0" smtClean="0"/>
+          </a:p>
+        </p:txBody>
+      </p:sp>
+      <p:sp>
+        <p:nvSpPr>
+          <p:cNvPr id="5" name="Rounded Rectangle 4"/>
+          <p:cNvSpPr/>
+          <p:nvPr/>
+        </p:nvSpPr>
+        <p:spPr>
+          <a:xfrm>
+            <a:off x="533400" y="2647950"/>
+            <a:ext cx="2057400" cy="381000"/>
+          </a:xfrm>
+          <a:prstGeom prst="roundRect">
+            <a:avLst/>
+          </a:prstGeom>
+        </p:spPr>
+        <p:style>
+          <a:lnRef idx="1">
+            <a:schemeClr val="accent6"/>
+          </a:lnRef>
+          <a:fillRef idx="2">
+            <a:schemeClr val="accent6"/>
+          </a:fillRef>
+          <a:effectRef idx="1">
+            <a:schemeClr val="accent6"/>
+          </a:effectRef>
+          <a:fontRef idx="minor">
+            <a:schemeClr val="dk1"/>
+          </a:fontRef>
+        </p:style>
+        <p:txBody>
+          <a:bodyPr rtlCol="0" anchor="ctr"/>
+          <a:lstStyle/>
+          <a:p>
+            <a:pPr algn="ctr"/>
+            <a:r>
+              <a:rPr lang="en-US" dirty="0" smtClean="0"/>
+              <a:t>CPU ::8040/10</a:t>
+            </a:r>
+            <a:endParaRPr lang="en-US" dirty="0"/>
+          </a:p>
+        </p:txBody>
+      </p:sp>
+      <p:sp>
+        <p:nvSpPr>
+          <p:cNvPr id="6" name="Rounded Rectangle 5"/>
+          <p:cNvSpPr/>
+          <p:nvPr/>
+        </p:nvSpPr>
+        <p:spPr>
+          <a:xfrm>
+            <a:off x="1143000" y="3181350"/>
+            <a:ext cx="2057400" cy="304800"/>
+          </a:xfrm>
+          <a:prstGeom prst="roundRect">
+            <a:avLst/>
+          </a:prstGeom>
+        </p:spPr>
+        <p:style>
+          <a:lnRef idx="1">
+            <a:schemeClr val="accent6"/>
+          </a:lnRef>
+          <a:fillRef idx="2">
+            <a:schemeClr val="accent6"/>
+          </a:fillRef>
+          <a:effectRef idx="1">
+            <a:schemeClr val="accent6"/>
+          </a:effectRef>
+          <a:fontRef idx="minor">
+            <a:schemeClr val="dk1"/>
+          </a:fontRef>
+        </p:style>
+        <p:txBody>
+          <a:bodyPr rtlCol="0" anchor="ctr"/>
+          <a:lstStyle/>
+          <a:p>
+            <a:pPr algn="ctr"/>
             <a:r>
               <a:rPr lang="en-US" dirty="0" err="1" smtClean="0"/>
-              <a:t>QoS</a:t>
-            </a:r>
-            <a:r>
-              <a:rPr lang="en-US" dirty="0" smtClean="0"/>
-              <a:t> for hard </a:t>
-            </a:r>
-            <a:r>
-              <a:rPr lang="en-US" dirty="0" err="1" smtClean="0"/>
-              <a:t>realtime</a:t>
-            </a:r>
-            <a:r>
-              <a:rPr lang="en-US" dirty="0" smtClean="0"/>
-              <a:t> systems</a:t>
-            </a:r>
+              <a:t>Mgmt</a:t>
+            </a:r>
+            <a:r>
+              <a:rPr lang="en-US" dirty="0" smtClean="0"/>
+              <a:t> ::8040/16</a:t>
+            </a:r>
+            <a:endParaRPr lang="en-US" dirty="0"/>
+          </a:p>
+        </p:txBody>
+      </p:sp>
+      <p:sp>
+        <p:nvSpPr>
+          <p:cNvPr id="7" name="Rounded Rectangle 6"/>
+          <p:cNvSpPr/>
+          <p:nvPr/>
+        </p:nvSpPr>
+        <p:spPr>
+          <a:xfrm>
+            <a:off x="1143000" y="3676650"/>
+            <a:ext cx="2057400" cy="304800"/>
+          </a:xfrm>
+          <a:prstGeom prst="roundRect">
+            <a:avLst/>
+          </a:prstGeom>
+        </p:spPr>
+        <p:style>
+          <a:lnRef idx="1">
+            <a:schemeClr val="accent6"/>
+          </a:lnRef>
+          <a:fillRef idx="2">
+            <a:schemeClr val="accent6"/>
+          </a:fillRef>
+          <a:effectRef idx="1">
+            <a:schemeClr val="accent6"/>
+          </a:effectRef>
+          <a:fontRef idx="minor">
+            <a:schemeClr val="dk1"/>
+          </a:fontRef>
+        </p:style>
+        <p:txBody>
+          <a:bodyPr rtlCol="0" anchor="ctr"/>
+          <a:lstStyle/>
+          <a:p>
+            <a:pPr algn="ctr"/>
+            <a:r>
+              <a:rPr lang="en-US" dirty="0" smtClean="0"/>
+              <a:t>App1 ::8060/16</a:t>
+            </a:r>
+            <a:endParaRPr lang="en-US" dirty="0"/>
+          </a:p>
+        </p:txBody>
+      </p:sp>
+      <p:sp>
+        <p:nvSpPr>
+          <p:cNvPr id="8" name="Rounded Rectangle 7"/>
+          <p:cNvSpPr/>
+          <p:nvPr/>
+        </p:nvSpPr>
+        <p:spPr>
+          <a:xfrm>
+            <a:off x="1143000" y="4171950"/>
+            <a:ext cx="2057400" cy="304800"/>
+          </a:xfrm>
+          <a:prstGeom prst="roundRect">
+            <a:avLst/>
+          </a:prstGeom>
+        </p:spPr>
+        <p:style>
+          <a:lnRef idx="1">
+            <a:schemeClr val="accent6"/>
+          </a:lnRef>
+          <a:fillRef idx="2">
+            <a:schemeClr val="accent6"/>
+          </a:fillRef>
+          <a:effectRef idx="1">
+            <a:schemeClr val="accent6"/>
+          </a:effectRef>
+          <a:fontRef idx="minor">
+            <a:schemeClr val="dk1"/>
+          </a:fontRef>
+        </p:style>
+        <p:txBody>
+          <a:bodyPr rtlCol="0" anchor="ctr"/>
+          <a:lstStyle/>
+          <a:p>
+            <a:pPr algn="ctr"/>
+            <a:r>
+              <a:rPr lang="en-US" dirty="0" smtClean="0"/>
+              <a:t>App2 ::8061/16</a:t>
+            </a:r>
+            <a:endParaRPr lang="en-US" dirty="0"/>
+          </a:p>
+        </p:txBody>
+      </p:sp>
+      <p:cxnSp>
+        <p:nvCxnSpPr>
+          <p:cNvPr id="10" name="Elbow Connector 9"/>
+          <p:cNvCxnSpPr>
+            <a:stCxn id="5" idx="2"/>
+            <a:endCxn id="6" idx="1"/>
+          </p:cNvCxnSpPr>
+          <p:nvPr/>
+        </p:nvCxnSpPr>
+        <p:spPr>
+          <a:xfrm rot="5400000">
+            <a:off x="1200150" y="2971800"/>
+            <a:ext cx="304800" cy="419100"/>
+          </a:xfrm>
+          <a:prstGeom prst="bentConnector4">
+            <a:avLst>
+              <a:gd name="adj1" fmla="val 25000"/>
+              <a:gd name="adj2" fmla="val 154545"/>
+            </a:avLst>
+          </a:prstGeom>
+          <a:ln>
+            <a:tailEnd type="triangle"/>
+          </a:ln>
+        </p:spPr>
+        <p:style>
+          <a:lnRef idx="3">
+            <a:schemeClr val="accent4"/>
+          </a:lnRef>
+          <a:fillRef idx="0">
+            <a:schemeClr val="accent4"/>
+          </a:fillRef>
+          <a:effectRef idx="2">
+            <a:schemeClr val="accent4"/>
+          </a:effectRef>
+          <a:fontRef idx="minor">
+            <a:schemeClr val="tx1"/>
+          </a:fontRef>
+        </p:style>
+      </p:cxnSp>
+      <p:cxnSp>
+        <p:nvCxnSpPr>
+          <p:cNvPr id="12" name="Elbow Connector 11"/>
+          <p:cNvCxnSpPr>
+            <a:stCxn id="5" idx="2"/>
+            <a:endCxn id="7" idx="1"/>
+          </p:cNvCxnSpPr>
+          <p:nvPr/>
+        </p:nvCxnSpPr>
+        <p:spPr>
+          <a:xfrm rot="5400000">
+            <a:off x="952500" y="3219450"/>
+            <a:ext cx="800100" cy="419100"/>
+          </a:xfrm>
+          <a:prstGeom prst="bentConnector4">
+            <a:avLst>
+              <a:gd name="adj1" fmla="val 10360"/>
+              <a:gd name="adj2" fmla="val 154545"/>
+            </a:avLst>
+          </a:prstGeom>
+          <a:ln>
+            <a:tailEnd type="triangle"/>
+          </a:ln>
+        </p:spPr>
+        <p:style>
+          <a:lnRef idx="3">
+            <a:schemeClr val="accent4"/>
+          </a:lnRef>
+          <a:fillRef idx="0">
+            <a:schemeClr val="accent4"/>
+          </a:fillRef>
+          <a:effectRef idx="2">
+            <a:schemeClr val="accent4"/>
+          </a:effectRef>
+          <a:fontRef idx="minor">
+            <a:schemeClr val="tx1"/>
+          </a:fontRef>
+        </p:style>
+      </p:cxnSp>
+      <p:cxnSp>
+        <p:nvCxnSpPr>
+          <p:cNvPr id="16" name="Elbow Connector 15"/>
+          <p:cNvCxnSpPr>
+            <a:stCxn id="5" idx="2"/>
+            <a:endCxn id="8" idx="1"/>
+          </p:cNvCxnSpPr>
+          <p:nvPr/>
+        </p:nvCxnSpPr>
+        <p:spPr>
+          <a:xfrm rot="5400000">
+            <a:off x="704850" y="3467100"/>
+            <a:ext cx="1295400" cy="419100"/>
+          </a:xfrm>
+          <a:prstGeom prst="bentConnector4">
+            <a:avLst>
+              <a:gd name="adj1" fmla="val 6439"/>
+              <a:gd name="adj2" fmla="val 154545"/>
+            </a:avLst>
+          </a:prstGeom>
+          <a:ln>
+            <a:tailEnd type="triangle"/>
+          </a:ln>
+        </p:spPr>
+        <p:style>
+          <a:lnRef idx="3">
+            <a:schemeClr val="accent4"/>
+          </a:lnRef>
+          <a:fillRef idx="0">
+            <a:schemeClr val="accent4"/>
+          </a:fillRef>
+          <a:effectRef idx="2">
+            <a:schemeClr val="accent4"/>
+          </a:effectRef>
+          <a:fontRef idx="minor">
+            <a:schemeClr val="tx1"/>
+          </a:fontRef>
+        </p:style>
+      </p:cxnSp>
+      <p:sp>
+        <p:nvSpPr>
+          <p:cNvPr id="21" name="Rounded Rectangle 20"/>
+          <p:cNvSpPr/>
+          <p:nvPr/>
+        </p:nvSpPr>
+        <p:spPr>
+          <a:xfrm>
+            <a:off x="4475308" y="2645376"/>
+            <a:ext cx="2057400" cy="381000"/>
+          </a:xfrm>
+          <a:prstGeom prst="roundRect">
+            <a:avLst/>
+          </a:prstGeom>
+        </p:spPr>
+        <p:style>
+          <a:lnRef idx="1">
+            <a:schemeClr val="accent6"/>
+          </a:lnRef>
+          <a:fillRef idx="2">
+            <a:schemeClr val="accent6"/>
+          </a:fillRef>
+          <a:effectRef idx="1">
+            <a:schemeClr val="accent6"/>
+          </a:effectRef>
+          <a:fontRef idx="minor">
+            <a:schemeClr val="dk1"/>
+          </a:fontRef>
+        </p:style>
+        <p:txBody>
+          <a:bodyPr rtlCol="0" anchor="ctr"/>
+          <a:lstStyle/>
+          <a:p>
+            <a:pPr algn="ctr"/>
+            <a:r>
+              <a:rPr lang="en-US" dirty="0" smtClean="0"/>
+              <a:t>RAM ::8003/16</a:t>
+            </a:r>
+            <a:endParaRPr lang="en-US" dirty="0"/>
+          </a:p>
+        </p:txBody>
+      </p:sp>
+      <p:sp>
+        <p:nvSpPr>
+          <p:cNvPr id="22" name="Rounded Rectangle 21"/>
+          <p:cNvSpPr/>
+          <p:nvPr/>
+        </p:nvSpPr>
+        <p:spPr>
+          <a:xfrm>
+            <a:off x="4475308" y="3238500"/>
+            <a:ext cx="2057400" cy="381000"/>
+          </a:xfrm>
+          <a:prstGeom prst="roundRect">
+            <a:avLst/>
+          </a:prstGeom>
+        </p:spPr>
+        <p:style>
+          <a:lnRef idx="1">
+            <a:schemeClr val="accent6"/>
+          </a:lnRef>
+          <a:fillRef idx="2">
+            <a:schemeClr val="accent6"/>
+          </a:fillRef>
+          <a:effectRef idx="1">
+            <a:schemeClr val="accent6"/>
+          </a:effectRef>
+          <a:fontRef idx="minor">
+            <a:schemeClr val="dk1"/>
+          </a:fontRef>
+        </p:style>
+        <p:txBody>
+          <a:bodyPr rtlCol="0" anchor="ctr"/>
+          <a:lstStyle/>
+          <a:p>
+            <a:pPr algn="ctr"/>
+            <a:r>
+              <a:rPr lang="en-US" dirty="0" smtClean="0"/>
+              <a:t>Flash::8004/16</a:t>
+            </a:r>
+            <a:endParaRPr lang="en-US" dirty="0"/>
+          </a:p>
+        </p:txBody>
+      </p:sp>
+      <p:cxnSp>
+        <p:nvCxnSpPr>
+          <p:cNvPr id="24" name="Elbow Connector 23"/>
+          <p:cNvCxnSpPr>
+            <a:stCxn id="5" idx="3"/>
+            <a:endCxn id="21" idx="1"/>
+          </p:cNvCxnSpPr>
+          <p:nvPr/>
+        </p:nvCxnSpPr>
+        <p:spPr>
+          <a:xfrm flipV="1">
+            <a:off x="2590800" y="2835876"/>
+            <a:ext cx="1884508" cy="2574"/>
+          </a:xfrm>
+          <a:prstGeom prst="bentConnector3">
+            <a:avLst/>
+          </a:prstGeom>
+          <a:ln>
+            <a:tailEnd type="triangle"/>
+          </a:ln>
+        </p:spPr>
+        <p:style>
+          <a:lnRef idx="3">
+            <a:schemeClr val="accent4"/>
+          </a:lnRef>
+          <a:fillRef idx="0">
+            <a:schemeClr val="accent4"/>
+          </a:fillRef>
+          <a:effectRef idx="2">
+            <a:schemeClr val="accent4"/>
+          </a:effectRef>
+          <a:fontRef idx="minor">
+            <a:schemeClr val="tx1"/>
+          </a:fontRef>
+        </p:style>
+      </p:cxnSp>
+      <p:cxnSp>
+        <p:nvCxnSpPr>
+          <p:cNvPr id="25" name="Elbow Connector 24"/>
+          <p:cNvCxnSpPr>
+            <a:stCxn id="5" idx="3"/>
+            <a:endCxn id="22" idx="1"/>
+          </p:cNvCxnSpPr>
+          <p:nvPr/>
+        </p:nvCxnSpPr>
+        <p:spPr>
+          <a:xfrm>
+            <a:off x="2590800" y="2838450"/>
+            <a:ext cx="1884508" cy="590550"/>
+          </a:xfrm>
+          <a:prstGeom prst="bentConnector3">
+            <a:avLst>
+              <a:gd name="adj1" fmla="val 83769"/>
+            </a:avLst>
+          </a:prstGeom>
+          <a:ln>
+            <a:tailEnd type="triangle"/>
+          </a:ln>
+        </p:spPr>
+        <p:style>
+          <a:lnRef idx="3">
+            <a:schemeClr val="accent4"/>
+          </a:lnRef>
+          <a:fillRef idx="0">
+            <a:schemeClr val="accent4"/>
+          </a:fillRef>
+          <a:effectRef idx="2">
+            <a:schemeClr val="accent4"/>
+          </a:effectRef>
+          <a:fontRef idx="minor">
+            <a:schemeClr val="tx1"/>
+          </a:fontRef>
+        </p:style>
+      </p:cxnSp>
+      <p:sp>
+        <p:nvSpPr>
+          <p:cNvPr id="29" name="Rectangle 28"/>
+          <p:cNvSpPr/>
+          <p:nvPr/>
+        </p:nvSpPr>
+        <p:spPr>
+          <a:xfrm>
+            <a:off x="304800" y="2571750"/>
+            <a:ext cx="3276600" cy="2133600"/>
+          </a:xfrm>
+          <a:prstGeom prst="rect">
+            <a:avLst/>
+          </a:prstGeom>
+          <a:noFill/>
+          <a:ln>
+            <a:solidFill>
+              <a:schemeClr val="accent2">
+                <a:lumMod val="60000"/>
+                <a:lumOff val="40000"/>
+              </a:schemeClr>
+            </a:solidFill>
+            <a:prstDash val="sysDot"/>
+          </a:ln>
+        </p:spPr>
+        <p:style>
+          <a:lnRef idx="2">
+            <a:schemeClr val="accent1">
+              <a:shade val="50000"/>
+            </a:schemeClr>
+          </a:lnRef>
+          <a:fillRef idx="1">
+            <a:schemeClr val="accent1"/>
+          </a:fillRef>
+          <a:effectRef idx="0">
+            <a:schemeClr val="accent1"/>
+          </a:effectRef>
+          <a:fontRef idx="minor">
+            <a:schemeClr val="lt1"/>
+          </a:fontRef>
+        </p:style>
+        <p:txBody>
+          <a:bodyPr rtlCol="0" anchor="ctr"/>
+          <a:lstStyle/>
+          <a:p>
+            <a:pPr algn="ctr"/>
+            <a:endParaRPr lang="en-US"/>
           </a:p>
         </p:txBody>
       </p:sp>
     </p:spTree>
     <p:extLst>
       <p:ext uri="{BB962C8B-B14F-4D97-AF65-F5344CB8AC3E}">
-        <p14:creationId xmlns:p14="http://schemas.microsoft.com/office/powerpoint/2010/main" val="486649115"/>
+        <p14:creationId xmlns:p14="http://schemas.microsoft.com/office/powerpoint/2010/main" val="427899088"/>
       </p:ext>
     </p:extLst>
   </p:cSld>
@@ -4658,7 +5113,7 @@
           <a:p>
             <a:r>
               <a:rPr lang="en-US" dirty="0" smtClean="0"/>
-              <a:t>Network-based access control</a:t>
+              <a:t>Communication</a:t>
             </a:r>
             <a:endParaRPr lang="en-US" dirty="0"/>
           </a:p>
@@ -4680,110 +5135,96 @@
           <a:lstStyle/>
           <a:p>
             <a:r>
+              <a:rPr lang="en-US" dirty="0" smtClean="0"/>
+              <a:t>Two parallel networks</a:t>
+            </a:r>
+          </a:p>
+          <a:p>
+            <a:pPr lvl="1"/>
+            <a:r>
+              <a:rPr lang="en-US" dirty="0" smtClean="0"/>
+              <a:t>RPC network: 4x 32 bit </a:t>
+            </a:r>
+            <a:r>
+              <a:rPr lang="en-US" dirty="0" smtClean="0"/>
+              <a:t>words, ≈ </a:t>
+            </a:r>
+            <a:r>
+              <a:rPr lang="en-US" dirty="0" err="1" smtClean="0"/>
+              <a:t>ioctl</a:t>
+            </a:r>
+            <a:r>
+              <a:rPr lang="en-US" dirty="0" smtClean="0"/>
+              <a:t>(2)</a:t>
+            </a:r>
+            <a:r>
+              <a:rPr lang="en-US" dirty="0" smtClean="0"/>
+              <a:t/>
+            </a:r>
+            <a:br>
+              <a:rPr lang="en-US" dirty="0" smtClean="0"/>
+            </a:br>
+            <a:r>
+              <a:rPr lang="en-US" dirty="0" smtClean="0"/>
+              <a:t>Typically accessed via CPU registers for low latency</a:t>
+            </a:r>
+          </a:p>
+          <a:p>
+            <a:pPr lvl="1"/>
+            <a:r>
+              <a:rPr lang="en-US" dirty="0" smtClean="0"/>
+              <a:t>DMA network: 1-512 word data plane blocks</a:t>
+            </a:r>
+            <a:r>
               <a:rPr lang="en-US" dirty="0"/>
-              <a:t>Provide CPU </a:t>
-            </a:r>
-            <a:r>
-              <a:rPr lang="en-US" dirty="0" err="1"/>
-              <a:t>insn</a:t>
-            </a:r>
-            <a:r>
+              <a:t/>
+            </a:r>
+            <a:br>
               <a:rPr lang="en-US" dirty="0"/>
-              <a:t> to send/</a:t>
-            </a:r>
-            <a:r>
-              <a:rPr lang="en-US" dirty="0" err="1"/>
-              <a:t>recv</a:t>
-            </a:r>
-            <a:r>
-              <a:rPr lang="en-US" dirty="0"/>
-              <a:t> </a:t>
-            </a:r>
-            <a:r>
-              <a:rPr lang="en-US" dirty="0" smtClean="0"/>
-              <a:t>message</a:t>
-            </a:r>
-          </a:p>
-          <a:p>
-            <a:r>
-              <a:rPr lang="en-US" dirty="0"/>
-              <a:t>Network accessed via formally verified transceiver IP</a:t>
+            </a:br>
+            <a:r>
+              <a:rPr lang="en-US" dirty="0" smtClean="0"/>
+              <a:t>Typically memory mapped</a:t>
+            </a:r>
+          </a:p>
+          <a:p>
+            <a:r>
+              <a:rPr lang="en-US" dirty="0" smtClean="0"/>
+              <a:t>Reliable datagrams</a:t>
             </a:r>
           </a:p>
           <a:p>
             <a:pPr lvl="1"/>
             <a:r>
-              <a:rPr lang="en-US" dirty="0"/>
-              <a:t>Untrusted 3</a:t>
-            </a:r>
-            <a:r>
-              <a:rPr lang="en-US" baseline="30000" dirty="0"/>
-              <a:t>rd</a:t>
-            </a:r>
-            <a:r>
-              <a:rPr lang="en-US" dirty="0"/>
-              <a:t>-party IP cores cannot spoof </a:t>
-            </a:r>
-            <a:r>
-              <a:rPr lang="en-US" dirty="0" smtClean="0"/>
-              <a:t>headers</a:t>
-            </a:r>
-            <a:endParaRPr lang="en-US" dirty="0"/>
+              <a:rPr lang="en-US" dirty="0" smtClean="0"/>
+              <a:t>In-order delivery between any pair of endpoints</a:t>
+            </a:r>
           </a:p>
           <a:p>
             <a:pPr lvl="1"/>
             <a:r>
               <a:rPr lang="en-US" dirty="0" smtClean="0"/>
-              <a:t>Neither can arbitrary code on the CPU</a:t>
-            </a:r>
-            <a:endParaRPr lang="en-US" dirty="0"/>
-          </a:p>
-          <a:p>
-            <a:r>
-              <a:rPr lang="en-US" dirty="0" smtClean="0"/>
-              <a:t>We can use packet headers for access control!</a:t>
-            </a:r>
-          </a:p>
-          <a:p>
-            <a:pPr lvl="1"/>
-            <a:r>
-              <a:rPr lang="en-US" dirty="0" smtClean="0"/>
-              <a:t>Node can tell </a:t>
-            </a:r>
-            <a:r>
-              <a:rPr lang="en-US" dirty="0"/>
-              <a:t>what </a:t>
-            </a:r>
-            <a:r>
-              <a:rPr lang="en-US" dirty="0" smtClean="0"/>
-              <a:t>app </a:t>
-            </a:r>
-            <a:r>
-              <a:rPr lang="en-US" dirty="0"/>
-              <a:t>is accessing it</a:t>
-            </a:r>
-          </a:p>
-          <a:p>
-            <a:pPr lvl="1"/>
-            <a:r>
-              <a:rPr lang="en-US" dirty="0" smtClean="0"/>
-              <a:t>Node makes </a:t>
-            </a:r>
-            <a:r>
-              <a:rPr lang="en-US" dirty="0"/>
-              <a:t>access control decision based on </a:t>
-            </a:r>
-            <a:r>
-              <a:rPr lang="en-US" dirty="0" err="1"/>
-              <a:t>msg</a:t>
-            </a:r>
-            <a:r>
-              <a:rPr lang="en-US" dirty="0"/>
-              <a:t> </a:t>
-            </a:r>
-            <a:r>
-              <a:rPr lang="en-US" dirty="0" smtClean="0"/>
-              <a:t>origin</a:t>
+              <a:t>Guaranteed </a:t>
+            </a:r>
+            <a:r>
+              <a:rPr lang="en-US" dirty="0" smtClean="0"/>
+              <a:t>minimum </a:t>
+            </a:r>
+            <a:r>
+              <a:rPr lang="en-US" dirty="0" err="1" smtClean="0"/>
+              <a:t>QoS</a:t>
+            </a:r>
+            <a:r>
+              <a:rPr lang="en-US" dirty="0" smtClean="0"/>
+              <a:t> for hard </a:t>
+            </a:r>
+            <a:r>
+              <a:rPr lang="en-US" dirty="0" err="1" smtClean="0"/>
+              <a:t>realtime</a:t>
+            </a:r>
+            <a:r>
+              <a:rPr lang="en-US" dirty="0" smtClean="0"/>
+              <a:t> systems</a:t>
             </a:r>
           </a:p>
         </p:txBody>
@@ -4791,7 +5232,7 @@
     </p:spTree>
     <p:extLst>
       <p:ext uri="{BB962C8B-B14F-4D97-AF65-F5344CB8AC3E}">
-        <p14:creationId xmlns:p14="http://schemas.microsoft.com/office/powerpoint/2010/main" val="814596600"/>
+        <p14:creationId xmlns:p14="http://schemas.microsoft.com/office/powerpoint/2010/main" val="486649115"/>
       </p:ext>
     </p:extLst>
   </p:cSld>
@@ -4842,7 +5283,7 @@
           <a:p>
             <a:r>
               <a:rPr lang="en-US" dirty="0" smtClean="0"/>
-              <a:t>IPC is now trivial</a:t>
+              <a:t>Network-based access control</a:t>
             </a:r>
             <a:endParaRPr lang="en-US" dirty="0"/>
           </a:p>
@@ -4864,32 +5305,118 @@
           <a:lstStyle/>
           <a:p>
             <a:r>
-              <a:rPr lang="en-US" dirty="0" smtClean="0"/>
-              <a:t>Each app already has a unique address on the </a:t>
-            </a:r>
-            <a:r>
-              <a:rPr lang="en-US" dirty="0" err="1" smtClean="0"/>
-              <a:t>NoC</a:t>
-            </a:r>
-            <a:endParaRPr lang="en-US" dirty="0" smtClean="0"/>
-          </a:p>
-          <a:p>
-            <a:r>
-              <a:rPr lang="en-US" dirty="0" smtClean="0"/>
-              <a:t>Just send a packet to </a:t>
-            </a:r>
-            <a:r>
-              <a:rPr lang="en-US" dirty="0" smtClean="0"/>
-              <a:t>the app’s address</a:t>
+              <a:rPr lang="en-US" dirty="0"/>
+              <a:t>Provide CPU </a:t>
+            </a:r>
+            <a:r>
+              <a:rPr lang="en-US" dirty="0" err="1"/>
+              <a:t>insn</a:t>
+            </a:r>
+            <a:r>
+              <a:rPr lang="en-US" dirty="0"/>
+              <a:t> to send/</a:t>
+            </a:r>
+            <a:r>
+              <a:rPr lang="en-US" dirty="0" err="1"/>
+              <a:t>recv</a:t>
+            </a:r>
+            <a:r>
+              <a:rPr lang="en-US" dirty="0"/>
+              <a:t> </a:t>
+            </a:r>
+            <a:r>
+              <a:rPr lang="en-US" dirty="0" smtClean="0"/>
+              <a:t>message</a:t>
+            </a:r>
+          </a:p>
+          <a:p>
+            <a:r>
+              <a:rPr lang="en-US" dirty="0"/>
+              <a:t>Network accessed via formally verified transceiver IP</a:t>
+            </a:r>
+          </a:p>
+          <a:p>
+            <a:pPr lvl="1"/>
+            <a:r>
+              <a:rPr lang="en-US" dirty="0"/>
+              <a:t>Untrusted 3</a:t>
+            </a:r>
+            <a:r>
+              <a:rPr lang="en-US" baseline="30000" dirty="0"/>
+              <a:t>rd</a:t>
+            </a:r>
+            <a:r>
+              <a:rPr lang="en-US" dirty="0"/>
+              <a:t>-party IP cores cannot spoof </a:t>
+            </a:r>
+            <a:r>
+              <a:rPr lang="en-US" dirty="0" smtClean="0"/>
+              <a:t>headers</a:t>
             </a:r>
             <a:endParaRPr lang="en-US" dirty="0"/>
+          </a:p>
+          <a:p>
+            <a:pPr lvl="1"/>
+            <a:r>
+              <a:rPr lang="en-US" dirty="0" smtClean="0"/>
+              <a:t>Neither can arbitrary code on the CPU</a:t>
+            </a:r>
+            <a:endParaRPr lang="en-US" dirty="0"/>
+          </a:p>
+          <a:p>
+            <a:r>
+              <a:rPr lang="en-US" dirty="0" smtClean="0"/>
+              <a:t>We can use packet headers for access control!</a:t>
+            </a:r>
+          </a:p>
+          <a:p>
+            <a:pPr lvl="1"/>
+            <a:r>
+              <a:rPr lang="en-US" dirty="0" smtClean="0"/>
+              <a:t>Node can tell </a:t>
+            </a:r>
+            <a:r>
+              <a:rPr lang="en-US" dirty="0"/>
+              <a:t>what </a:t>
+            </a:r>
+            <a:r>
+              <a:rPr lang="en-US" dirty="0" smtClean="0"/>
+              <a:t>app </a:t>
+            </a:r>
+            <a:r>
+              <a:rPr lang="en-US" dirty="0"/>
+              <a:t>is accessing it</a:t>
+            </a:r>
+          </a:p>
+          <a:p>
+            <a:pPr lvl="1"/>
+            <a:r>
+              <a:rPr lang="en-US" dirty="0" smtClean="0"/>
+              <a:t>Node makes </a:t>
+            </a:r>
+            <a:r>
+              <a:rPr lang="en-US" dirty="0"/>
+              <a:t>access control decision based on </a:t>
+            </a:r>
+            <a:r>
+              <a:rPr lang="en-US" dirty="0" err="1"/>
+              <a:t>msg</a:t>
+            </a:r>
+            <a:r>
+              <a:rPr lang="en-US" dirty="0"/>
+              <a:t> </a:t>
+            </a:r>
+            <a:r>
+              <a:rPr lang="en-US" dirty="0" smtClean="0"/>
+              <a:t>origin</a:t>
+            </a:r>
           </a:p>
         </p:txBody>
       </p:sp>
     </p:spTree>
     <p:extLst>
       <p:ext uri="{BB962C8B-B14F-4D97-AF65-F5344CB8AC3E}">
-        <p14:creationId xmlns:p14="http://schemas.microsoft.com/office/powerpoint/2010/main" val="3859439470"/>
+        <p14:creationId xmlns:p14="http://schemas.microsoft.com/office/powerpoint/2010/main" val="814596600"/>
       </p:ext>
     </p:extLst>
   </p:cSld>
@@ -4940,23 +5467,7 @@
           <a:p>
             <a:r>
               <a:rPr lang="en-US" dirty="0" smtClean="0"/>
-              <a:t>Surely </a:t>
-            </a:r>
-            <a:r>
-              <a:rPr lang="en-US" dirty="0" err="1" smtClean="0"/>
-              <a:t>sbrk</a:t>
-            </a:r>
-            <a:r>
-              <a:rPr lang="en-US" dirty="0" smtClean="0"/>
-              <a:t>/</a:t>
-            </a:r>
-            <a:r>
-              <a:rPr lang="en-US" dirty="0" err="1" smtClean="0"/>
-              <a:t>malloc</a:t>
-            </a:r>
-            <a:r>
-              <a:rPr lang="en-US" dirty="0" smtClean="0"/>
-              <a:t> must be in ring 0…</a:t>
+              <a:t>IPC is now trivial</a:t>
             </a:r>
             <a:endParaRPr lang="en-US" dirty="0"/>
           </a:p>
@@ -4979,6 +5490,655 @@
           <a:p>
             <a:r>
               <a:rPr lang="en-US" dirty="0" smtClean="0"/>
+              <a:t>Each app already has a unique address on the </a:t>
+            </a:r>
+            <a:r>
+              <a:rPr lang="en-US" dirty="0" err="1" smtClean="0"/>
+              <a:t>NoC</a:t>
+            </a:r>
+            <a:endParaRPr lang="en-US" dirty="0" smtClean="0"/>
+          </a:p>
+          <a:p>
+            <a:r>
+              <a:rPr lang="en-US" dirty="0" smtClean="0"/>
+              <a:t>Just send a packet to </a:t>
+            </a:r>
+            <a:r>
+              <a:rPr lang="en-US" dirty="0" smtClean="0"/>
+              <a:t>the app’s address</a:t>
+            </a:r>
+            <a:endParaRPr lang="en-US" dirty="0"/>
+          </a:p>
+        </p:txBody>
+      </p:sp>
+      <p:sp>
+        <p:nvSpPr>
+          <p:cNvPr id="5" name="Rounded Rectangle 4"/>
+          <p:cNvSpPr/>
+          <p:nvPr/>
+        </p:nvSpPr>
+        <p:spPr>
+          <a:xfrm>
+            <a:off x="533400" y="2647950"/>
+            <a:ext cx="2057400" cy="381000"/>
+          </a:xfrm>
+          <a:prstGeom prst="roundRect">
+            <a:avLst/>
+          </a:prstGeom>
+        </p:spPr>
+        <p:style>
+          <a:lnRef idx="1">
+            <a:schemeClr val="accent6"/>
+          </a:lnRef>
+          <a:fillRef idx="2">
+            <a:schemeClr val="accent6"/>
+          </a:fillRef>
+          <a:effectRef idx="1">
+            <a:schemeClr val="accent6"/>
+          </a:effectRef>
+          <a:fontRef idx="minor">
+            <a:schemeClr val="dk1"/>
+          </a:fontRef>
+        </p:style>
+        <p:txBody>
+          <a:bodyPr rtlCol="0" anchor="ctr"/>
+          <a:lstStyle/>
+          <a:p>
+            <a:pPr algn="ctr"/>
+            <a:r>
+              <a:rPr lang="en-US" dirty="0" smtClean="0"/>
+              <a:t>CPU ::8040/10</a:t>
+            </a:r>
+            <a:endParaRPr lang="en-US" dirty="0"/>
+          </a:p>
+        </p:txBody>
+      </p:sp>
+      <p:sp>
+        <p:nvSpPr>
+          <p:cNvPr id="6" name="Rounded Rectangle 5"/>
+          <p:cNvSpPr/>
+          <p:nvPr/>
+        </p:nvSpPr>
+        <p:spPr>
+          <a:xfrm>
+            <a:off x="1143000" y="3181350"/>
+            <a:ext cx="2057400" cy="304800"/>
+          </a:xfrm>
+          <a:prstGeom prst="roundRect">
+            <a:avLst/>
+          </a:prstGeom>
+        </p:spPr>
+        <p:style>
+          <a:lnRef idx="1">
+            <a:schemeClr val="accent6"/>
+          </a:lnRef>
+          <a:fillRef idx="2">
+            <a:schemeClr val="accent6"/>
+          </a:fillRef>
+          <a:effectRef idx="1">
+            <a:schemeClr val="accent6"/>
+          </a:effectRef>
+          <a:fontRef idx="minor">
+            <a:schemeClr val="dk1"/>
+          </a:fontRef>
+        </p:style>
+        <p:txBody>
+          <a:bodyPr rtlCol="0" anchor="ctr"/>
+          <a:lstStyle/>
+          <a:p>
+            <a:pPr algn="ctr"/>
+            <a:r>
+              <a:rPr lang="en-US" dirty="0" err="1" smtClean="0"/>
+              <a:t>Mgmt</a:t>
+            </a:r>
+            <a:r>
+              <a:rPr lang="en-US" dirty="0" smtClean="0"/>
+              <a:t> ::8040/16</a:t>
+            </a:r>
+            <a:endParaRPr lang="en-US" dirty="0"/>
+          </a:p>
+        </p:txBody>
+      </p:sp>
+      <p:sp>
+        <p:nvSpPr>
+          <p:cNvPr id="7" name="Rounded Rectangle 6"/>
+          <p:cNvSpPr/>
+          <p:nvPr/>
+        </p:nvSpPr>
+        <p:spPr>
+          <a:xfrm>
+            <a:off x="1143000" y="3676650"/>
+            <a:ext cx="2057400" cy="304800"/>
+          </a:xfrm>
+          <a:prstGeom prst="roundRect">
+            <a:avLst/>
+          </a:prstGeom>
+        </p:spPr>
+        <p:style>
+          <a:lnRef idx="1">
+            <a:schemeClr val="accent6"/>
+          </a:lnRef>
+          <a:fillRef idx="2">
+            <a:schemeClr val="accent6"/>
+          </a:fillRef>
+          <a:effectRef idx="1">
+            <a:schemeClr val="accent6"/>
+          </a:effectRef>
+          <a:fontRef idx="minor">
+            <a:schemeClr val="dk1"/>
+          </a:fontRef>
+        </p:style>
+        <p:txBody>
+          <a:bodyPr rtlCol="0" anchor="ctr"/>
+          <a:lstStyle/>
+          <a:p>
+            <a:pPr algn="ctr"/>
+            <a:r>
+              <a:rPr lang="en-US" dirty="0" smtClean="0"/>
+              <a:t>App1 ::8060/16</a:t>
+            </a:r>
+            <a:endParaRPr lang="en-US" dirty="0"/>
+          </a:p>
+        </p:txBody>
+      </p:sp>
+      <p:sp>
+        <p:nvSpPr>
+          <p:cNvPr id="8" name="Rounded Rectangle 7"/>
+          <p:cNvSpPr/>
+          <p:nvPr/>
+        </p:nvSpPr>
+        <p:spPr>
+          <a:xfrm>
+            <a:off x="1143000" y="4171950"/>
+            <a:ext cx="2057400" cy="304800"/>
+          </a:xfrm>
+          <a:prstGeom prst="roundRect">
+            <a:avLst/>
+          </a:prstGeom>
+        </p:spPr>
+        <p:style>
+          <a:lnRef idx="1">
+            <a:schemeClr val="accent6"/>
+          </a:lnRef>
+          <a:fillRef idx="2">
+            <a:schemeClr val="accent6"/>
+          </a:fillRef>
+          <a:effectRef idx="1">
+            <a:schemeClr val="accent6"/>
+          </a:effectRef>
+          <a:fontRef idx="minor">
+            <a:schemeClr val="dk1"/>
+          </a:fontRef>
+        </p:style>
+        <p:txBody>
+          <a:bodyPr rtlCol="0" anchor="ctr"/>
+          <a:lstStyle/>
+          <a:p>
+            <a:pPr algn="ctr"/>
+            <a:r>
+              <a:rPr lang="en-US" dirty="0" smtClean="0"/>
+              <a:t>App2 ::8061/16</a:t>
+            </a:r>
+            <a:endParaRPr lang="en-US" dirty="0"/>
+          </a:p>
+        </p:txBody>
+      </p:sp>
+      <p:cxnSp>
+        <p:nvCxnSpPr>
+          <p:cNvPr id="9" name="Elbow Connector 8"/>
+          <p:cNvCxnSpPr>
+            <a:stCxn id="5" idx="2"/>
+            <a:endCxn id="6" idx="1"/>
+          </p:cNvCxnSpPr>
+          <p:nvPr/>
+        </p:nvCxnSpPr>
+        <p:spPr>
+          <a:xfrm rot="5400000">
+            <a:off x="1200150" y="2971800"/>
+            <a:ext cx="304800" cy="419100"/>
+          </a:xfrm>
+          <a:prstGeom prst="bentConnector4">
+            <a:avLst>
+              <a:gd name="adj1" fmla="val 25000"/>
+              <a:gd name="adj2" fmla="val 154545"/>
+            </a:avLst>
+          </a:prstGeom>
+          <a:ln>
+            <a:tailEnd type="triangle"/>
+          </a:ln>
+        </p:spPr>
+        <p:style>
+          <a:lnRef idx="3">
+            <a:schemeClr val="accent4"/>
+          </a:lnRef>
+          <a:fillRef idx="0">
+            <a:schemeClr val="accent4"/>
+          </a:fillRef>
+          <a:effectRef idx="2">
+            <a:schemeClr val="accent4"/>
+          </a:effectRef>
+          <a:fontRef idx="minor">
+            <a:schemeClr val="tx1"/>
+          </a:fontRef>
+        </p:style>
+      </p:cxnSp>
+      <p:cxnSp>
+        <p:nvCxnSpPr>
+          <p:cNvPr id="10" name="Elbow Connector 9"/>
+          <p:cNvCxnSpPr>
+            <a:stCxn id="5" idx="2"/>
+            <a:endCxn id="7" idx="1"/>
+          </p:cNvCxnSpPr>
+          <p:nvPr/>
+        </p:nvCxnSpPr>
+        <p:spPr>
+          <a:xfrm rot="5400000">
+            <a:off x="952500" y="3219450"/>
+            <a:ext cx="800100" cy="419100"/>
+          </a:xfrm>
+          <a:prstGeom prst="bentConnector4">
+            <a:avLst>
+              <a:gd name="adj1" fmla="val 10360"/>
+              <a:gd name="adj2" fmla="val 154545"/>
+            </a:avLst>
+          </a:prstGeom>
+          <a:ln>
+            <a:tailEnd type="triangle"/>
+          </a:ln>
+        </p:spPr>
+        <p:style>
+          <a:lnRef idx="3">
+            <a:schemeClr val="accent4"/>
+          </a:lnRef>
+          <a:fillRef idx="0">
+            <a:schemeClr val="accent4"/>
+          </a:fillRef>
+          <a:effectRef idx="2">
+            <a:schemeClr val="accent4"/>
+          </a:effectRef>
+          <a:fontRef idx="minor">
+            <a:schemeClr val="tx1"/>
+          </a:fontRef>
+        </p:style>
+      </p:cxnSp>
+      <p:cxnSp>
+        <p:nvCxnSpPr>
+          <p:cNvPr id="11" name="Elbow Connector 10"/>
+          <p:cNvCxnSpPr>
+            <a:stCxn id="5" idx="2"/>
+            <a:endCxn id="8" idx="1"/>
+          </p:cNvCxnSpPr>
+          <p:nvPr/>
+        </p:nvCxnSpPr>
+        <p:spPr>
+          <a:xfrm rot="5400000">
+            <a:off x="704850" y="3467100"/>
+            <a:ext cx="1295400" cy="419100"/>
+          </a:xfrm>
+          <a:prstGeom prst="bentConnector4">
+            <a:avLst>
+              <a:gd name="adj1" fmla="val 6439"/>
+              <a:gd name="adj2" fmla="val 154545"/>
+            </a:avLst>
+          </a:prstGeom>
+          <a:ln>
+            <a:tailEnd type="triangle"/>
+          </a:ln>
+        </p:spPr>
+        <p:style>
+          <a:lnRef idx="3">
+            <a:schemeClr val="accent4"/>
+          </a:lnRef>
+          <a:fillRef idx="0">
+            <a:schemeClr val="accent4"/>
+          </a:fillRef>
+          <a:effectRef idx="2">
+            <a:schemeClr val="accent4"/>
+          </a:effectRef>
+          <a:fontRef idx="minor">
+            <a:schemeClr val="tx1"/>
+          </a:fontRef>
+        </p:style>
+      </p:cxnSp>
+      <p:sp>
+        <p:nvSpPr>
+          <p:cNvPr id="12" name="Rounded Rectangle 11"/>
+          <p:cNvSpPr/>
+          <p:nvPr/>
+        </p:nvSpPr>
+        <p:spPr>
+          <a:xfrm>
+            <a:off x="4475308" y="2645376"/>
+            <a:ext cx="2057400" cy="381000"/>
+          </a:xfrm>
+          <a:prstGeom prst="roundRect">
+            <a:avLst/>
+          </a:prstGeom>
+        </p:spPr>
+        <p:style>
+          <a:lnRef idx="1">
+            <a:schemeClr val="accent6"/>
+          </a:lnRef>
+          <a:fillRef idx="2">
+            <a:schemeClr val="accent6"/>
+          </a:fillRef>
+          <a:effectRef idx="1">
+            <a:schemeClr val="accent6"/>
+          </a:effectRef>
+          <a:fontRef idx="minor">
+            <a:schemeClr val="dk1"/>
+          </a:fontRef>
+        </p:style>
+        <p:txBody>
+          <a:bodyPr rtlCol="0" anchor="ctr"/>
+          <a:lstStyle/>
+          <a:p>
+            <a:pPr algn="ctr"/>
+            <a:r>
+              <a:rPr lang="en-US" dirty="0" smtClean="0"/>
+              <a:t>RAM ::8003/16</a:t>
+            </a:r>
+            <a:endParaRPr lang="en-US" dirty="0"/>
+          </a:p>
+        </p:txBody>
+      </p:sp>
+      <p:sp>
+        <p:nvSpPr>
+          <p:cNvPr id="13" name="Rounded Rectangle 12"/>
+          <p:cNvSpPr/>
+          <p:nvPr/>
+        </p:nvSpPr>
+        <p:spPr>
+          <a:xfrm>
+            <a:off x="4475308" y="3238500"/>
+            <a:ext cx="2057400" cy="381000"/>
+          </a:xfrm>
+          <a:prstGeom prst="roundRect">
+            <a:avLst/>
+          </a:prstGeom>
+        </p:spPr>
+        <p:style>
+          <a:lnRef idx="1">
+            <a:schemeClr val="accent6"/>
+          </a:lnRef>
+          <a:fillRef idx="2">
+            <a:schemeClr val="accent6"/>
+          </a:fillRef>
+          <a:effectRef idx="1">
+            <a:schemeClr val="accent6"/>
+          </a:effectRef>
+          <a:fontRef idx="minor">
+            <a:schemeClr val="dk1"/>
+          </a:fontRef>
+        </p:style>
+        <p:txBody>
+          <a:bodyPr rtlCol="0" anchor="ctr"/>
+          <a:lstStyle/>
+          <a:p>
+            <a:pPr algn="ctr"/>
+            <a:r>
+              <a:rPr lang="en-US" dirty="0" smtClean="0"/>
+              <a:t>Flash::8004/16</a:t>
+            </a:r>
+            <a:endParaRPr lang="en-US" dirty="0"/>
+          </a:p>
+        </p:txBody>
+      </p:sp>
+      <p:cxnSp>
+        <p:nvCxnSpPr>
+          <p:cNvPr id="14" name="Elbow Connector 13"/>
+          <p:cNvCxnSpPr>
+            <a:stCxn id="5" idx="3"/>
+            <a:endCxn id="12" idx="1"/>
+          </p:cNvCxnSpPr>
+          <p:nvPr/>
+        </p:nvCxnSpPr>
+        <p:spPr>
+          <a:xfrm flipV="1">
+            <a:off x="2590800" y="2835876"/>
+            <a:ext cx="1884508" cy="2574"/>
+          </a:xfrm>
+          <a:prstGeom prst="bentConnector3">
+            <a:avLst/>
+          </a:prstGeom>
+          <a:ln>
+            <a:tailEnd type="triangle"/>
+          </a:ln>
+        </p:spPr>
+        <p:style>
+          <a:lnRef idx="3">
+            <a:schemeClr val="accent4"/>
+          </a:lnRef>
+          <a:fillRef idx="0">
+            <a:schemeClr val="accent4"/>
+          </a:fillRef>
+          <a:effectRef idx="2">
+            <a:schemeClr val="accent4"/>
+          </a:effectRef>
+          <a:fontRef idx="minor">
+            <a:schemeClr val="tx1"/>
+          </a:fontRef>
+        </p:style>
+      </p:cxnSp>
+      <p:cxnSp>
+        <p:nvCxnSpPr>
+          <p:cNvPr id="15" name="Elbow Connector 14"/>
+          <p:cNvCxnSpPr>
+            <a:stCxn id="5" idx="3"/>
+            <a:endCxn id="13" idx="1"/>
+          </p:cNvCxnSpPr>
+          <p:nvPr/>
+        </p:nvCxnSpPr>
+        <p:spPr>
+          <a:xfrm>
+            <a:off x="2590800" y="2838450"/>
+            <a:ext cx="1884508" cy="590550"/>
+          </a:xfrm>
+          <a:prstGeom prst="bentConnector3">
+            <a:avLst>
+              <a:gd name="adj1" fmla="val 83769"/>
+            </a:avLst>
+          </a:prstGeom>
+          <a:ln>
+            <a:tailEnd type="triangle"/>
+          </a:ln>
+        </p:spPr>
+        <p:style>
+          <a:lnRef idx="3">
+            <a:schemeClr val="accent4"/>
+          </a:lnRef>
+          <a:fillRef idx="0">
+            <a:schemeClr val="accent4"/>
+          </a:fillRef>
+          <a:effectRef idx="2">
+            <a:schemeClr val="accent4"/>
+          </a:effectRef>
+          <a:fontRef idx="minor">
+            <a:schemeClr val="tx1"/>
+          </a:fontRef>
+        </p:style>
+      </p:cxnSp>
+      <p:sp>
+        <p:nvSpPr>
+          <p:cNvPr id="16" name="Rectangle 15"/>
+          <p:cNvSpPr/>
+          <p:nvPr/>
+        </p:nvSpPr>
+        <p:spPr>
+          <a:xfrm>
+            <a:off x="304800" y="2571750"/>
+            <a:ext cx="3276600" cy="2133600"/>
+          </a:xfrm>
+          <a:prstGeom prst="rect">
+            <a:avLst/>
+          </a:prstGeom>
+          <a:noFill/>
+          <a:ln>
+            <a:solidFill>
+              <a:schemeClr val="accent2">
+                <a:lumMod val="60000"/>
+                <a:lumOff val="40000"/>
+              </a:schemeClr>
+            </a:solidFill>
+            <a:prstDash val="sysDot"/>
+          </a:ln>
+        </p:spPr>
+        <p:style>
+          <a:lnRef idx="2">
+            <a:schemeClr val="accent1">
+              <a:shade val="50000"/>
+            </a:schemeClr>
+          </a:lnRef>
+          <a:fillRef idx="1">
+            <a:schemeClr val="accent1"/>
+          </a:fillRef>
+          <a:effectRef idx="0">
+            <a:schemeClr val="accent1"/>
+          </a:effectRef>
+          <a:fontRef idx="minor">
+            <a:schemeClr val="lt1"/>
+          </a:fontRef>
+        </p:style>
+        <p:txBody>
+          <a:bodyPr rtlCol="0" anchor="ctr"/>
+          <a:lstStyle/>
+          <a:p>
+            <a:pPr algn="ctr"/>
+            <a:endParaRPr lang="en-US"/>
+          </a:p>
+        </p:txBody>
+      </p:sp>
+      <p:cxnSp>
+        <p:nvCxnSpPr>
+          <p:cNvPr id="18" name="Elbow Connector 17"/>
+          <p:cNvCxnSpPr>
+            <a:stCxn id="7" idx="3"/>
+            <a:endCxn id="8" idx="3"/>
+          </p:cNvCxnSpPr>
+          <p:nvPr/>
+        </p:nvCxnSpPr>
+        <p:spPr>
+          <a:xfrm>
+            <a:off x="3200400" y="3829050"/>
+            <a:ext cx="12700" cy="495300"/>
+          </a:xfrm>
+          <a:prstGeom prst="bentConnector3">
+            <a:avLst>
+              <a:gd name="adj1" fmla="val 7031252"/>
+            </a:avLst>
+          </a:prstGeom>
+          <a:ln>
+            <a:tailEnd type="triangle"/>
+          </a:ln>
+        </p:spPr>
+        <p:style>
+          <a:lnRef idx="3">
+            <a:schemeClr val="accent3"/>
+          </a:lnRef>
+          <a:fillRef idx="0">
+            <a:schemeClr val="accent3"/>
+          </a:fillRef>
+          <a:effectRef idx="2">
+            <a:schemeClr val="accent3"/>
+          </a:effectRef>
+          <a:fontRef idx="minor">
+            <a:schemeClr val="tx1"/>
+          </a:fontRef>
+        </p:style>
+      </p:cxnSp>
+    </p:spTree>
+    <p:extLst>
+      <p:ext uri="{BB962C8B-B14F-4D97-AF65-F5344CB8AC3E}">
+        <p14:creationId xmlns:p14="http://schemas.microsoft.com/office/powerpoint/2010/main" val="3859439470"/>
+      </p:ext>
+    </p:extLst>
+  </p:cSld>
+  <p:clrMapOvr>
+    <a:masterClrMapping/>
+  </p:clrMapOvr>
+  <p:timing>
+    <p:tnLst>
+      <p:par>
+        <p:cTn id="1" dur="indefinite" restart="never" nodeType="tmRoot"/>
+      </p:par>
+    </p:tnLst>
+  </p:timing>
+</p:sld>
+</file>
+
+<file path=ppt/slides/slide14.xml><?xml version="1.0" encoding="utf-8"?>
+<p:sld xmlns:a="http://schemas.openxmlformats.org/drawingml/2006/main" xmlns:r="http://schemas.openxmlformats.org/officeDocument/2006/relationships" xmlns:p="http://schemas.openxmlformats.org/presentationml/2006/main">
+  <p:cSld>
+    <p:spTree>
+      <p:nvGrpSpPr>
+        <p:cNvPr id="1" name=""/>
+        <p:cNvGrpSpPr/>
+        <p:nvPr/>
+      </p:nvGrpSpPr>
+      <p:grpSpPr>
+        <a:xfrm>
+          <a:off x="0" y="0"/>
+          <a:ext cx="0" cy="0"/>
+          <a:chOff x="0" y="0"/>
+          <a:chExt cx="0" cy="0"/>
+        </a:xfrm>
+      </p:grpSpPr>
+      <p:sp>
+        <p:nvSpPr>
+          <p:cNvPr id="2" name="Title 1"/>
+          <p:cNvSpPr>
+            <a:spLocks noGrp="1"/>
+          </p:cNvSpPr>
+          <p:nvPr>
+            <p:ph type="title"/>
+          </p:nvPr>
+        </p:nvSpPr>
+        <p:spPr/>
+        <p:txBody>
+          <a:bodyPr/>
+          <a:lstStyle/>
+          <a:p>
+            <a:r>
+              <a:rPr lang="en-US" dirty="0" smtClean="0"/>
+              <a:t>Surely </a:t>
+            </a:r>
+            <a:r>
+              <a:rPr lang="en-US" dirty="0" err="1" smtClean="0"/>
+              <a:t>sbrk</a:t>
+            </a:r>
+            <a:r>
+              <a:rPr lang="en-US" dirty="0" smtClean="0"/>
+              <a:t>/</a:t>
+            </a:r>
+            <a:r>
+              <a:rPr lang="en-US" dirty="0" err="1" smtClean="0"/>
+              <a:t>malloc</a:t>
+            </a:r>
+            <a:r>
+              <a:rPr lang="en-US" dirty="0" smtClean="0"/>
+              <a:t> must be in ring 0…</a:t>
+            </a:r>
+            <a:endParaRPr lang="en-US" dirty="0"/>
+          </a:p>
+        </p:txBody>
+      </p:sp>
+      <p:sp>
+        <p:nvSpPr>
+          <p:cNvPr id="3" name="Content Placeholder 2"/>
+          <p:cNvSpPr>
+            <a:spLocks noGrp="1"/>
+          </p:cNvSpPr>
+          <p:nvPr>
+            <p:ph idx="1"/>
+          </p:nvPr>
+        </p:nvSpPr>
+        <p:spPr/>
+        <p:txBody>
+          <a:bodyPr/>
+          <a:lstStyle/>
+          <a:p>
+            <a:r>
+              <a:rPr lang="en-US" dirty="0" smtClean="0"/>
               <a:t>Processor MMU </a:t>
             </a:r>
             <a:r>
@@ -5045,6 +6205,460 @@
           </a:p>
         </p:txBody>
       </p:sp>
+      <p:sp>
+        <p:nvSpPr>
+          <p:cNvPr id="4" name="Rounded Rectangle 3"/>
+          <p:cNvSpPr/>
+          <p:nvPr/>
+        </p:nvSpPr>
+        <p:spPr>
+          <a:xfrm>
+            <a:off x="762000" y="3333750"/>
+            <a:ext cx="2057400" cy="381000"/>
+          </a:xfrm>
+          <a:prstGeom prst="roundRect">
+            <a:avLst/>
+          </a:prstGeom>
+        </p:spPr>
+        <p:style>
+          <a:lnRef idx="1">
+            <a:schemeClr val="accent6"/>
+          </a:lnRef>
+          <a:fillRef idx="2">
+            <a:schemeClr val="accent6"/>
+          </a:fillRef>
+          <a:effectRef idx="1">
+            <a:schemeClr val="accent6"/>
+          </a:effectRef>
+          <a:fontRef idx="minor">
+            <a:schemeClr val="dk1"/>
+          </a:fontRef>
+        </p:style>
+        <p:txBody>
+          <a:bodyPr rtlCol="0" anchor="ctr"/>
+          <a:lstStyle/>
+          <a:p>
+            <a:pPr algn="ctr"/>
+            <a:r>
+              <a:rPr lang="en-US" dirty="0" smtClean="0"/>
+              <a:t>CPU ::8040/10</a:t>
+            </a:r>
+            <a:endParaRPr lang="en-US" dirty="0"/>
+          </a:p>
+        </p:txBody>
+      </p:sp>
+      <p:sp>
+        <p:nvSpPr>
+          <p:cNvPr id="5" name="Rounded Rectangle 4"/>
+          <p:cNvSpPr/>
+          <p:nvPr/>
+        </p:nvSpPr>
+        <p:spPr>
+          <a:xfrm>
+            <a:off x="1371600" y="3867150"/>
+            <a:ext cx="2057400" cy="304800"/>
+          </a:xfrm>
+          <a:prstGeom prst="roundRect">
+            <a:avLst/>
+          </a:prstGeom>
+        </p:spPr>
+        <p:style>
+          <a:lnRef idx="1">
+            <a:schemeClr val="accent6"/>
+          </a:lnRef>
+          <a:fillRef idx="2">
+            <a:schemeClr val="accent6"/>
+          </a:fillRef>
+          <a:effectRef idx="1">
+            <a:schemeClr val="accent6"/>
+          </a:effectRef>
+          <a:fontRef idx="minor">
+            <a:schemeClr val="dk1"/>
+          </a:fontRef>
+        </p:style>
+        <p:txBody>
+          <a:bodyPr rtlCol="0" anchor="ctr"/>
+          <a:lstStyle/>
+          <a:p>
+            <a:pPr algn="ctr"/>
+            <a:r>
+              <a:rPr lang="en-US" dirty="0" err="1" smtClean="0"/>
+              <a:t>Mgmt</a:t>
+            </a:r>
+            <a:r>
+              <a:rPr lang="en-US" dirty="0" smtClean="0"/>
+              <a:t> ::8040/16</a:t>
+            </a:r>
+            <a:endParaRPr lang="en-US" dirty="0"/>
+          </a:p>
+        </p:txBody>
+      </p:sp>
+      <p:sp>
+        <p:nvSpPr>
+          <p:cNvPr id="6" name="Rounded Rectangle 5"/>
+          <p:cNvSpPr/>
+          <p:nvPr/>
+        </p:nvSpPr>
+        <p:spPr>
+          <a:xfrm>
+            <a:off x="1371600" y="4362450"/>
+            <a:ext cx="2057400" cy="304800"/>
+          </a:xfrm>
+          <a:prstGeom prst="roundRect">
+            <a:avLst/>
+          </a:prstGeom>
+        </p:spPr>
+        <p:style>
+          <a:lnRef idx="1">
+            <a:schemeClr val="accent6"/>
+          </a:lnRef>
+          <a:fillRef idx="2">
+            <a:schemeClr val="accent6"/>
+          </a:fillRef>
+          <a:effectRef idx="1">
+            <a:schemeClr val="accent6"/>
+          </a:effectRef>
+          <a:fontRef idx="minor">
+            <a:schemeClr val="dk1"/>
+          </a:fontRef>
+        </p:style>
+        <p:txBody>
+          <a:bodyPr rtlCol="0" anchor="ctr"/>
+          <a:lstStyle/>
+          <a:p>
+            <a:pPr algn="ctr"/>
+            <a:r>
+              <a:rPr lang="en-US" dirty="0" smtClean="0"/>
+              <a:t>App1 ::8060/16</a:t>
+            </a:r>
+            <a:endParaRPr lang="en-US" dirty="0"/>
+          </a:p>
+        </p:txBody>
+      </p:sp>
+      <p:cxnSp>
+        <p:nvCxnSpPr>
+          <p:cNvPr id="8" name="Elbow Connector 7"/>
+          <p:cNvCxnSpPr>
+            <a:stCxn id="4" idx="2"/>
+            <a:endCxn id="5" idx="1"/>
+          </p:cNvCxnSpPr>
+          <p:nvPr/>
+        </p:nvCxnSpPr>
+        <p:spPr>
+          <a:xfrm rot="5400000">
+            <a:off x="1428750" y="3657600"/>
+            <a:ext cx="304800" cy="419100"/>
+          </a:xfrm>
+          <a:prstGeom prst="bentConnector4">
+            <a:avLst>
+              <a:gd name="adj1" fmla="val 25000"/>
+              <a:gd name="adj2" fmla="val 154545"/>
+            </a:avLst>
+          </a:prstGeom>
+          <a:ln>
+            <a:tailEnd type="triangle"/>
+          </a:ln>
+        </p:spPr>
+        <p:style>
+          <a:lnRef idx="3">
+            <a:schemeClr val="accent4"/>
+          </a:lnRef>
+          <a:fillRef idx="0">
+            <a:schemeClr val="accent4"/>
+          </a:fillRef>
+          <a:effectRef idx="2">
+            <a:schemeClr val="accent4"/>
+          </a:effectRef>
+          <a:fontRef idx="minor">
+            <a:schemeClr val="tx1"/>
+          </a:fontRef>
+        </p:style>
+      </p:cxnSp>
+      <p:cxnSp>
+        <p:nvCxnSpPr>
+          <p:cNvPr id="9" name="Elbow Connector 8"/>
+          <p:cNvCxnSpPr>
+            <a:stCxn id="4" idx="2"/>
+            <a:endCxn id="6" idx="1"/>
+          </p:cNvCxnSpPr>
+          <p:nvPr/>
+        </p:nvCxnSpPr>
+        <p:spPr>
+          <a:xfrm rot="5400000">
+            <a:off x="1181100" y="3905250"/>
+            <a:ext cx="800100" cy="419100"/>
+          </a:xfrm>
+          <a:prstGeom prst="bentConnector4">
+            <a:avLst>
+              <a:gd name="adj1" fmla="val 10360"/>
+              <a:gd name="adj2" fmla="val 154545"/>
+            </a:avLst>
+          </a:prstGeom>
+          <a:ln>
+            <a:tailEnd type="triangle"/>
+          </a:ln>
+        </p:spPr>
+        <p:style>
+          <a:lnRef idx="3">
+            <a:schemeClr val="accent4"/>
+          </a:lnRef>
+          <a:fillRef idx="0">
+            <a:schemeClr val="accent4"/>
+          </a:fillRef>
+          <a:effectRef idx="2">
+            <a:schemeClr val="accent4"/>
+          </a:effectRef>
+          <a:fontRef idx="minor">
+            <a:schemeClr val="tx1"/>
+          </a:fontRef>
+        </p:style>
+      </p:cxnSp>
+      <p:sp>
+        <p:nvSpPr>
+          <p:cNvPr id="11" name="Rounded Rectangle 10"/>
+          <p:cNvSpPr/>
+          <p:nvPr/>
+        </p:nvSpPr>
+        <p:spPr>
+          <a:xfrm>
+            <a:off x="4703908" y="3331176"/>
+            <a:ext cx="2057400" cy="381000"/>
+          </a:xfrm>
+          <a:prstGeom prst="roundRect">
+            <a:avLst/>
+          </a:prstGeom>
+        </p:spPr>
+        <p:style>
+          <a:lnRef idx="1">
+            <a:schemeClr val="accent6"/>
+          </a:lnRef>
+          <a:fillRef idx="2">
+            <a:schemeClr val="accent6"/>
+          </a:fillRef>
+          <a:effectRef idx="1">
+            <a:schemeClr val="accent6"/>
+          </a:effectRef>
+          <a:fontRef idx="minor">
+            <a:schemeClr val="dk1"/>
+          </a:fontRef>
+        </p:style>
+        <p:txBody>
+          <a:bodyPr rtlCol="0" anchor="ctr"/>
+          <a:lstStyle/>
+          <a:p>
+            <a:pPr algn="ctr"/>
+            <a:r>
+              <a:rPr lang="en-US" dirty="0" smtClean="0"/>
+              <a:t>RAM ::8003/16</a:t>
+            </a:r>
+            <a:endParaRPr lang="en-US" dirty="0"/>
+          </a:p>
+        </p:txBody>
+      </p:sp>
+      <p:sp>
+        <p:nvSpPr>
+          <p:cNvPr id="12" name="Rounded Rectangle 11"/>
+          <p:cNvSpPr/>
+          <p:nvPr/>
+        </p:nvSpPr>
+        <p:spPr>
+          <a:xfrm>
+            <a:off x="4703908" y="3924300"/>
+            <a:ext cx="2057400" cy="381000"/>
+          </a:xfrm>
+          <a:prstGeom prst="roundRect">
+            <a:avLst/>
+          </a:prstGeom>
+        </p:spPr>
+        <p:style>
+          <a:lnRef idx="1">
+            <a:schemeClr val="accent6"/>
+          </a:lnRef>
+          <a:fillRef idx="2">
+            <a:schemeClr val="accent6"/>
+          </a:fillRef>
+          <a:effectRef idx="1">
+            <a:schemeClr val="accent6"/>
+          </a:effectRef>
+          <a:fontRef idx="minor">
+            <a:schemeClr val="dk1"/>
+          </a:fontRef>
+        </p:style>
+        <p:txBody>
+          <a:bodyPr rtlCol="0" anchor="ctr"/>
+          <a:lstStyle/>
+          <a:p>
+            <a:pPr algn="ctr"/>
+            <a:r>
+              <a:rPr lang="en-US" dirty="0" smtClean="0"/>
+              <a:t>Flash::8004/16</a:t>
+            </a:r>
+            <a:endParaRPr lang="en-US" dirty="0"/>
+          </a:p>
+        </p:txBody>
+      </p:sp>
+      <p:cxnSp>
+        <p:nvCxnSpPr>
+          <p:cNvPr id="13" name="Elbow Connector 12"/>
+          <p:cNvCxnSpPr>
+            <a:stCxn id="4" idx="3"/>
+            <a:endCxn id="11" idx="1"/>
+          </p:cNvCxnSpPr>
+          <p:nvPr/>
+        </p:nvCxnSpPr>
+        <p:spPr>
+          <a:xfrm flipV="1">
+            <a:off x="2819400" y="3521676"/>
+            <a:ext cx="1884508" cy="2574"/>
+          </a:xfrm>
+          <a:prstGeom prst="bentConnector3">
+            <a:avLst/>
+          </a:prstGeom>
+          <a:ln>
+            <a:tailEnd type="triangle"/>
+          </a:ln>
+        </p:spPr>
+        <p:style>
+          <a:lnRef idx="3">
+            <a:schemeClr val="accent4"/>
+          </a:lnRef>
+          <a:fillRef idx="0">
+            <a:schemeClr val="accent4"/>
+          </a:fillRef>
+          <a:effectRef idx="2">
+            <a:schemeClr val="accent4"/>
+          </a:effectRef>
+          <a:fontRef idx="minor">
+            <a:schemeClr val="tx1"/>
+          </a:fontRef>
+        </p:style>
+      </p:cxnSp>
+      <p:cxnSp>
+        <p:nvCxnSpPr>
+          <p:cNvPr id="14" name="Elbow Connector 13"/>
+          <p:cNvCxnSpPr>
+            <a:stCxn id="4" idx="3"/>
+            <a:endCxn id="12" idx="1"/>
+          </p:cNvCxnSpPr>
+          <p:nvPr/>
+        </p:nvCxnSpPr>
+        <p:spPr>
+          <a:xfrm>
+            <a:off x="2819400" y="3524250"/>
+            <a:ext cx="1884508" cy="590550"/>
+          </a:xfrm>
+          <a:prstGeom prst="bentConnector3">
+            <a:avLst>
+              <a:gd name="adj1" fmla="val 83769"/>
+            </a:avLst>
+          </a:prstGeom>
+          <a:ln>
+            <a:tailEnd type="triangle"/>
+          </a:ln>
+        </p:spPr>
+        <p:style>
+          <a:lnRef idx="3">
+            <a:schemeClr val="accent4"/>
+          </a:lnRef>
+          <a:fillRef idx="0">
+            <a:schemeClr val="accent4"/>
+          </a:fillRef>
+          <a:effectRef idx="2">
+            <a:schemeClr val="accent4"/>
+          </a:effectRef>
+          <a:fontRef idx="minor">
+            <a:schemeClr val="tx1"/>
+          </a:fontRef>
+        </p:style>
+      </p:cxnSp>
+      <p:sp>
+        <p:nvSpPr>
+          <p:cNvPr id="15" name="Rectangle 14"/>
+          <p:cNvSpPr/>
+          <p:nvPr/>
+        </p:nvSpPr>
+        <p:spPr>
+          <a:xfrm>
+            <a:off x="533400" y="3257550"/>
+            <a:ext cx="3276600" cy="1524000"/>
+          </a:xfrm>
+          <a:prstGeom prst="rect">
+            <a:avLst/>
+          </a:prstGeom>
+          <a:noFill/>
+          <a:ln>
+            <a:solidFill>
+              <a:schemeClr val="accent2">
+                <a:lumMod val="60000"/>
+                <a:lumOff val="40000"/>
+              </a:schemeClr>
+            </a:solidFill>
+            <a:prstDash val="sysDot"/>
+          </a:ln>
+        </p:spPr>
+        <p:style>
+          <a:lnRef idx="2">
+            <a:schemeClr val="accent1">
+              <a:shade val="50000"/>
+            </a:schemeClr>
+          </a:lnRef>
+          <a:fillRef idx="1">
+            <a:schemeClr val="accent1"/>
+          </a:fillRef>
+          <a:effectRef idx="0">
+            <a:schemeClr val="accent1"/>
+          </a:effectRef>
+          <a:fontRef idx="minor">
+            <a:schemeClr val="lt1"/>
+          </a:fontRef>
+        </p:style>
+        <p:txBody>
+          <a:bodyPr rtlCol="0" anchor="ctr"/>
+          <a:lstStyle/>
+          <a:p>
+            <a:pPr algn="ctr"/>
+            <a:endParaRPr lang="en-US"/>
+          </a:p>
+        </p:txBody>
+      </p:sp>
+      <p:cxnSp>
+        <p:nvCxnSpPr>
+          <p:cNvPr id="16" name="Elbow Connector 15"/>
+          <p:cNvCxnSpPr>
+            <a:stCxn id="6" idx="3"/>
+            <a:endCxn id="5" idx="3"/>
+          </p:cNvCxnSpPr>
+          <p:nvPr/>
+        </p:nvCxnSpPr>
+        <p:spPr>
+          <a:xfrm flipV="1">
+            <a:off x="3429000" y="4019550"/>
+            <a:ext cx="12700" cy="495300"/>
+          </a:xfrm>
+          <a:prstGeom prst="bentConnector3">
+            <a:avLst>
+              <a:gd name="adj1" fmla="val 5118748"/>
+            </a:avLst>
+          </a:prstGeom>
+          <a:ln>
+            <a:tailEnd type="triangle"/>
+          </a:ln>
+        </p:spPr>
+        <p:style>
+          <a:lnRef idx="3">
+            <a:schemeClr val="accent3"/>
+          </a:lnRef>
+          <a:fillRef idx="0">
+            <a:schemeClr val="accent3"/>
+          </a:fillRef>
+          <a:effectRef idx="2">
+            <a:schemeClr val="accent3"/>
+          </a:effectRef>
+          <a:fontRef idx="minor">
+            <a:schemeClr val="tx1"/>
+          </a:fontRef>
+        </p:style>
+      </p:cxnSp>
     </p:spTree>
     <p:extLst>
       <p:ext uri="{BB962C8B-B14F-4D97-AF65-F5344CB8AC3E}">
@@ -5065,7 +6679,7 @@
 </p:sld>
 </file>
 
-<file path=ppt/slides/slide14.xml><?xml version="1.0" encoding="utf-8"?>
+<file path=ppt/slides/slide15.xml><?xml version="1.0" encoding="utf-8"?>
 <p:sld xmlns:a="http://schemas.openxmlformats.org/drawingml/2006/main" xmlns:r="http://schemas.openxmlformats.org/officeDocument/2006/relationships" xmlns:p="http://schemas.openxmlformats.org/presentationml/2006/main">
   <p:cSld>
     <p:spTree>
@@ -5615,147 +7229,6 @@
 </p:sld>
 </file>
 
-<file path=ppt/slides/slide15.xml><?xml version="1.0" encoding="utf-8"?>
-<p:sld xmlns:a="http://schemas.openxmlformats.org/drawingml/2006/main" xmlns:r="http://schemas.openxmlformats.org/officeDocument/2006/relationships" xmlns:p="http://schemas.openxmlformats.org/presentationml/2006/main">
-  <p:cSld>
-    <p:spTree>
-      <p:nvGrpSpPr>
-        <p:cNvPr id="1" name=""/>
-        <p:cNvGrpSpPr/>
-        <p:nvPr/>
-      </p:nvGrpSpPr>
-      <p:grpSpPr>
-        <a:xfrm>
-          <a:off x="0" y="0"/>
-          <a:ext cx="0" cy="0"/>
-          <a:chOff x="0" y="0"/>
-          <a:chExt cx="0" cy="0"/>
-        </a:xfrm>
-      </p:grpSpPr>
-      <p:sp>
-        <p:nvSpPr>
-          <p:cNvPr id="2" name="Title 1"/>
-          <p:cNvSpPr>
-            <a:spLocks noGrp="1"/>
-          </p:cNvSpPr>
-          <p:nvPr>
-            <p:ph type="title"/>
-          </p:nvPr>
-        </p:nvSpPr>
-        <p:spPr/>
-        <p:txBody>
-          <a:bodyPr/>
-          <a:lstStyle/>
-          <a:p>
-            <a:r>
-              <a:rPr lang="en-US" dirty="0" smtClean="0"/>
-              <a:t>Smart </a:t>
-            </a:r>
-            <a:r>
-              <a:rPr lang="en-US" dirty="0" smtClean="0"/>
-              <a:t>RAM </a:t>
-            </a:r>
-            <a:r>
-              <a:rPr lang="en-US" dirty="0" smtClean="0"/>
-              <a:t>controller</a:t>
-            </a:r>
-            <a:endParaRPr lang="en-US" dirty="0"/>
-          </a:p>
-        </p:txBody>
-      </p:sp>
-      <p:sp>
-        <p:nvSpPr>
-          <p:cNvPr id="3" name="Content Placeholder 2"/>
-          <p:cNvSpPr>
-            <a:spLocks noGrp="1"/>
-          </p:cNvSpPr>
-          <p:nvPr>
-            <p:ph idx="1"/>
-          </p:nvPr>
-        </p:nvSpPr>
-        <p:spPr/>
-        <p:txBody>
-          <a:bodyPr/>
-          <a:lstStyle/>
-          <a:p>
-            <a:r>
-              <a:rPr lang="en-US" dirty="0"/>
-              <a:t>Trivially simple data structures</a:t>
-            </a:r>
-          </a:p>
-          <a:p>
-            <a:pPr lvl="1"/>
-            <a:r>
-              <a:rPr lang="en-US" dirty="0"/>
-              <a:t>FIFO of free pages</a:t>
-            </a:r>
-          </a:p>
-          <a:p>
-            <a:pPr lvl="1"/>
-            <a:r>
-              <a:rPr lang="en-US" dirty="0"/>
-              <a:t>Array of page </a:t>
-            </a:r>
-            <a:r>
-              <a:rPr lang="en-US" dirty="0" smtClean="0"/>
-              <a:t>owners</a:t>
-            </a:r>
-          </a:p>
-          <a:p>
-            <a:pPr lvl="1"/>
-            <a:r>
-              <a:rPr lang="en-US" dirty="0" smtClean="0"/>
-              <a:t>Control state machine is ~500 lines including fluff</a:t>
-            </a:r>
-            <a:endParaRPr lang="en-US" dirty="0" smtClean="0"/>
-          </a:p>
-          <a:p>
-            <a:r>
-              <a:rPr lang="en-US" dirty="0" smtClean="0"/>
-              <a:t>Easy to </a:t>
-            </a:r>
-            <a:r>
-              <a:rPr lang="en-US" dirty="0" smtClean="0"/>
-              <a:t>test / verify</a:t>
-            </a:r>
-          </a:p>
-          <a:p>
-            <a:pPr lvl="1"/>
-            <a:r>
-              <a:rPr lang="en-US" dirty="0" smtClean="0"/>
-              <a:t>Thoroughly covered by automated test suite</a:t>
-            </a:r>
-          </a:p>
-          <a:p>
-            <a:pPr lvl="1"/>
-            <a:r>
-              <a:rPr lang="en-US" dirty="0" smtClean="0"/>
-              <a:t>Formal verification in near future</a:t>
-            </a:r>
-            <a:endParaRPr lang="en-US" dirty="0"/>
-          </a:p>
-        </p:txBody>
-      </p:sp>
-    </p:spTree>
-    <p:extLst>
-      <p:ext uri="{BB962C8B-B14F-4D97-AF65-F5344CB8AC3E}">
-        <p14:creationId xmlns:p14="http://schemas.microsoft.com/office/powerpoint/2010/main" val="492132790"/>
-      </p:ext>
-    </p:extLst>
-  </p:cSld>
-  <p:clrMapOvr>
-    <a:masterClrMapping/>
-  </p:clrMapOvr>
-  <p:timing>
-    <p:tnLst>
-      <p:par>
-        <p:cTn id="1" dur="indefinite" restart="never" nodeType="tmRoot"/>
-      </p:par>
-    </p:tnLst>
-  </p:timing>
-</p:sld>
-</file>
-
 <file path=ppt/slides/slide16.xml><?xml version="1.0" encoding="utf-8"?>
 <p:sld xmlns:a="http://schemas.openxmlformats.org/drawingml/2006/main" xmlns:r="http://schemas.openxmlformats.org/officeDocument/2006/relationships" xmlns:p="http://schemas.openxmlformats.org/presentationml/2006/main">
   <p:cSld>
@@ -5790,7 +7263,15 @@
           <a:p>
             <a:r>
               <a:rPr lang="en-US" dirty="0" smtClean="0"/>
-              <a:t>So what’s left in ring 0?</a:t>
+              <a:t>Smart </a:t>
+            </a:r>
+            <a:r>
+              <a:rPr lang="en-US" dirty="0" smtClean="0"/>
+              <a:t>RAM </a:t>
+            </a:r>
+            <a:r>
+              <a:rPr lang="en-US" dirty="0" smtClean="0"/>
+              <a:t>controller</a:t>
             </a:r>
             <a:endParaRPr lang="en-US" dirty="0"/>
           </a:p>
@@ -5812,51 +7293,67 @@
           <a:lstStyle/>
           <a:p>
             <a:r>
-              <a:rPr lang="en-US" i="1" dirty="0" smtClean="0"/>
-              <a:t>Nothing!</a:t>
+              <a:rPr lang="en-US" dirty="0"/>
+              <a:t>Trivially simple data structures</a:t>
+            </a:r>
+          </a:p>
+          <a:p>
+            <a:pPr lvl="1"/>
+            <a:r>
+              <a:rPr lang="en-US" dirty="0"/>
+              <a:t>FIFO of free pages</a:t>
+            </a:r>
+          </a:p>
+          <a:p>
+            <a:pPr lvl="1"/>
+            <a:r>
+              <a:rPr lang="en-US" dirty="0"/>
+              <a:t>Array of page </a:t>
+            </a:r>
+            <a:r>
+              <a:rPr lang="en-US" dirty="0" smtClean="0"/>
+              <a:t>owners</a:t>
+            </a:r>
+          </a:p>
+          <a:p>
+            <a:pPr lvl="1"/>
+            <a:r>
+              <a:rPr lang="en-US" dirty="0" smtClean="0"/>
+              <a:t>Control state machine is ~500 lines including fluff</a:t>
+            </a:r>
+            <a:endParaRPr lang="en-US" dirty="0" smtClean="0"/>
+          </a:p>
+          <a:p>
+            <a:r>
+              <a:rPr lang="en-US" dirty="0" smtClean="0"/>
+              <a:t>Easy to </a:t>
+            </a:r>
+            <a:r>
+              <a:rPr lang="en-US" dirty="0" smtClean="0"/>
+              <a:t>test / verify</a:t>
+            </a:r>
+          </a:p>
+          <a:p>
+            <a:pPr lvl="1"/>
+            <a:r>
+              <a:rPr lang="en-US" dirty="0" smtClean="0"/>
+              <a:t>Thoroughly covered by automated test suite</a:t>
+            </a:r>
+          </a:p>
+          <a:p>
+            <a:pPr lvl="1"/>
+            <a:r>
+              <a:rPr lang="en-US" dirty="0" smtClean="0"/>
+              <a:t>Formal verification in near future</a:t>
             </a:r>
             <a:endParaRPr lang="en-US" dirty="0"/>
-          </a:p>
-          <a:p>
-            <a:r>
-              <a:rPr lang="en-US" dirty="0" smtClean="0"/>
-              <a:t>Remove privileged instructions from the ISA</a:t>
-            </a:r>
-          </a:p>
-          <a:p>
-            <a:r>
-              <a:rPr lang="en-US" dirty="0" smtClean="0"/>
-              <a:t>Run userspace on bare metal</a:t>
-            </a:r>
-          </a:p>
-          <a:p>
-            <a:r>
-              <a:rPr lang="en-US" dirty="0" smtClean="0"/>
-              <a:t>This is an </a:t>
-            </a:r>
-            <a:r>
-              <a:rPr lang="en-US" i="1" dirty="0" err="1" smtClean="0"/>
-              <a:t>antikernel</a:t>
-            </a:r>
-            <a:r>
-              <a:rPr lang="en-US" i="1" dirty="0" smtClean="0"/>
-              <a:t> – </a:t>
-            </a:r>
-            <a:r>
-              <a:rPr lang="en-US" dirty="0" smtClean="0"/>
-              <a:t>an OS with </a:t>
-            </a:r>
-            <a:r>
-              <a:rPr lang="en-US" i="1" dirty="0" smtClean="0"/>
-              <a:t>no kernel at all!</a:t>
-            </a:r>
           </a:p>
         </p:txBody>
       </p:sp>
     </p:spTree>
     <p:extLst>
       <p:ext uri="{BB962C8B-B14F-4D97-AF65-F5344CB8AC3E}">
-        <p14:creationId xmlns:p14="http://schemas.microsoft.com/office/powerpoint/2010/main" val="2222965466"/>
+        <p14:creationId xmlns:p14="http://schemas.microsoft.com/office/powerpoint/2010/main" val="492132790"/>
       </p:ext>
     </p:extLst>
   </p:cSld>
@@ -5907,7 +7404,7 @@
           <a:p>
             <a:r>
               <a:rPr lang="en-US" dirty="0" smtClean="0"/>
-              <a:t>Key concepts</a:t>
+              <a:t>So what’s left in ring 0?</a:t>
             </a:r>
             <a:endParaRPr lang="en-US" dirty="0"/>
           </a:p>
@@ -5929,36 +7426,51 @@
           <a:lstStyle/>
           <a:p>
             <a:r>
-              <a:rPr lang="en-US" dirty="0" smtClean="0"/>
-              <a:t>This is not just a “hardware microkernel”</a:t>
-            </a:r>
-          </a:p>
-          <a:p>
-            <a:r>
-              <a:rPr lang="en-US" dirty="0" smtClean="0"/>
-              <a:t>The “OS” is an emergent entity created from many independent state machines</a:t>
-            </a:r>
-          </a:p>
-          <a:p>
-            <a:r>
-              <a:rPr lang="en-US" dirty="0" smtClean="0"/>
-              <a:t>These subsystems communicate in a limited, formally defined manner (complete encapsulation of state</a:t>
-            </a:r>
-            <a:r>
-              <a:rPr lang="en-US" dirty="0" smtClean="0"/>
-              <a:t>)</a:t>
-            </a:r>
-            <a:endParaRPr lang="en-US" dirty="0" smtClean="0"/>
-          </a:p>
-          <a:p>
+              <a:rPr lang="en-US" i="1" dirty="0" smtClean="0"/>
+              <a:t>Nothing!</a:t>
+            </a:r>
             <a:endParaRPr lang="en-US" dirty="0"/>
+          </a:p>
+          <a:p>
+            <a:r>
+              <a:rPr lang="en-US" dirty="0" smtClean="0"/>
+              <a:t>Remove privileged instructions from the ISA</a:t>
+            </a:r>
+          </a:p>
+          <a:p>
+            <a:r>
+              <a:rPr lang="en-US" dirty="0" smtClean="0"/>
+              <a:t>Run userspace on bare metal</a:t>
+            </a:r>
+          </a:p>
+          <a:p>
+            <a:r>
+              <a:rPr lang="en-US" dirty="0" smtClean="0"/>
+              <a:t>This is an </a:t>
+            </a:r>
+            <a:r>
+              <a:rPr lang="en-US" i="1" dirty="0" err="1" smtClean="0"/>
+              <a:t>antikernel</a:t>
+            </a:r>
+            <a:r>
+              <a:rPr lang="en-US" i="1" dirty="0" smtClean="0"/>
+              <a:t> – </a:t>
+            </a:r>
+            <a:r>
+              <a:rPr lang="en-US" dirty="0" smtClean="0"/>
+              <a:t>an OS with </a:t>
+            </a:r>
+            <a:r>
+              <a:rPr lang="en-US" i="1" dirty="0" smtClean="0"/>
+              <a:t>no kernel at all!</a:t>
+            </a:r>
           </a:p>
         </p:txBody>
       </p:sp>
     </p:spTree>
     <p:extLst>
       <p:ext uri="{BB962C8B-B14F-4D97-AF65-F5344CB8AC3E}">
-        <p14:creationId xmlns:p14="http://schemas.microsoft.com/office/powerpoint/2010/main" val="3572758977"/>
+        <p14:creationId xmlns:p14="http://schemas.microsoft.com/office/powerpoint/2010/main" val="2222965466"/>
       </p:ext>
     </p:extLst>
   </p:cSld>
@@ -6009,7 +7521,7 @@
           <a:p>
             <a:r>
               <a:rPr lang="en-US" dirty="0" smtClean="0"/>
-              <a:t>Modularity for security</a:t>
+              <a:t>Key concepts</a:t>
             </a:r>
             <a:endParaRPr lang="en-US" dirty="0"/>
           </a:p>
@@ -6031,46 +7543,28 @@
           <a:lstStyle/>
           <a:p>
             <a:r>
-              <a:rPr lang="en-US" dirty="0"/>
-              <a:t>Each </a:t>
-            </a:r>
-            <a:r>
-              <a:rPr lang="en-US" dirty="0" smtClean="0"/>
-              <a:t>node maintains </a:t>
-            </a:r>
-            <a:r>
-              <a:rPr lang="en-US" dirty="0"/>
-              <a:t>its own security state</a:t>
-            </a:r>
-          </a:p>
-          <a:p>
-            <a:r>
-              <a:rPr lang="en-US" dirty="0" smtClean="0"/>
-              <a:t>Your </a:t>
-            </a:r>
-            <a:r>
-              <a:rPr lang="en-US" dirty="0"/>
-              <a:t>TCB is what you make </a:t>
-            </a:r>
-            <a:r>
-              <a:rPr lang="en-US" dirty="0" smtClean="0"/>
-              <a:t>it</a:t>
-            </a:r>
-          </a:p>
-          <a:p>
-            <a:pPr lvl="1"/>
-            <a:r>
-              <a:rPr lang="en-US" dirty="0" smtClean="0"/>
-              <a:t>A </a:t>
-            </a:r>
-            <a:r>
-              <a:rPr lang="en-US" dirty="0" err="1" smtClean="0"/>
-              <a:t>vuln</a:t>
-            </a:r>
-            <a:r>
-              <a:rPr lang="en-US" dirty="0" smtClean="0"/>
-              <a:t> in a node you don’t depend on has zero impact on your app’s security</a:t>
-            </a:r>
+              <a:rPr lang="en-US" dirty="0" smtClean="0"/>
+              <a:t>This is not just a “hardware microkernel”</a:t>
+            </a:r>
+          </a:p>
+          <a:p>
+            <a:r>
+              <a:rPr lang="en-US" dirty="0" smtClean="0"/>
+              <a:t>The “OS” is an emergent entity created from many independent state machines</a:t>
+            </a:r>
+          </a:p>
+          <a:p>
+            <a:r>
+              <a:rPr lang="en-US" dirty="0" smtClean="0"/>
+              <a:t>These subsystems communicate in a limited, formally defined manner (complete encapsulation of state</a:t>
+            </a:r>
+            <a:r>
+              <a:rPr lang="en-US" dirty="0" smtClean="0"/>
+              <a:t>)</a:t>
+            </a:r>
+            <a:endParaRPr lang="en-US" dirty="0" smtClean="0"/>
+          </a:p>
+          <a:p>
             <a:endParaRPr lang="en-US" dirty="0"/>
           </a:p>
         </p:txBody>
@@ -6078,7 +7572,7 @@
     </p:spTree>
     <p:extLst>
       <p:ext uri="{BB962C8B-B14F-4D97-AF65-F5344CB8AC3E}">
-        <p14:creationId xmlns:p14="http://schemas.microsoft.com/office/powerpoint/2010/main" val="1272722905"/>
+        <p14:creationId xmlns:p14="http://schemas.microsoft.com/office/powerpoint/2010/main" val="3572758977"/>
       </p:ext>
     </p:extLst>
   </p:cSld>
@@ -6129,7 +7623,7 @@
           <a:p>
             <a:r>
               <a:rPr lang="en-US" dirty="0" smtClean="0"/>
-              <a:t>SARATOGA CPU</a:t>
+              <a:t>Modularity for security</a:t>
             </a:r>
             <a:endParaRPr lang="en-US" dirty="0"/>
           </a:p>
@@ -6151,93 +7645,62 @@
           <a:lstStyle/>
           <a:p>
             <a:r>
-              <a:rPr lang="en-US" dirty="0" smtClean="0"/>
-              <a:t>Compatible with </a:t>
+              <a:rPr lang="en-US" dirty="0"/>
+              <a:t>Each </a:t>
+            </a:r>
+            <a:r>
+              <a:rPr lang="en-US" dirty="0" smtClean="0"/>
+              <a:t>node maintains </a:t>
+            </a:r>
+            <a:r>
+              <a:rPr lang="en-US" dirty="0"/>
+              <a:t>its own security state</a:t>
+            </a:r>
+          </a:p>
+          <a:p>
+            <a:r>
+              <a:rPr lang="en-US" dirty="0" smtClean="0"/>
+              <a:t>Your </a:t>
+            </a:r>
+            <a:r>
+              <a:rPr lang="en-US" dirty="0"/>
+              <a:t>TCB is what you make </a:t>
+            </a:r>
+            <a:r>
+              <a:rPr lang="en-US" dirty="0" smtClean="0"/>
+              <a:t>it</a:t>
+            </a:r>
+          </a:p>
+          <a:p>
+            <a:pPr lvl="1"/>
+            <a:r>
+              <a:rPr lang="en-US" dirty="0" smtClean="0"/>
+              <a:t>A </a:t>
             </a:r>
             <a:r>
               <a:rPr lang="en-US" dirty="0" err="1" smtClean="0"/>
-              <a:t>mips</a:t>
-            </a:r>
-            <a:r>
-              <a:rPr lang="en-US" dirty="0" smtClean="0"/>
-              <a:t> GCC but not full MIPS</a:t>
-            </a:r>
-          </a:p>
-          <a:p>
-            <a:r>
-              <a:rPr lang="en-US" dirty="0" smtClean="0"/>
-              <a:t>8 stage barrel processor, 200 MHz on Artix-7</a:t>
-            </a:r>
-          </a:p>
-          <a:p>
-            <a:pPr lvl="1"/>
-            <a:r>
-              <a:rPr lang="en-US" dirty="0" smtClean="0"/>
-              <a:t>2 cycles each </a:t>
-            </a:r>
-            <a:r>
-              <a:rPr lang="en-US" dirty="0" err="1" smtClean="0"/>
-              <a:t>i</a:t>
-            </a:r>
-            <a:r>
-              <a:rPr lang="en-US" dirty="0" smtClean="0"/>
-              <a:t>-fetch, r-fetch</a:t>
-            </a:r>
-            <a:endParaRPr lang="en-US" dirty="0" smtClean="0"/>
-          </a:p>
-          <a:p>
-            <a:pPr lvl="1"/>
-            <a:r>
-              <a:rPr lang="en-US" dirty="0" smtClean="0"/>
-              <a:t>4 cycles execution</a:t>
-            </a:r>
-          </a:p>
-          <a:p>
-            <a:r>
-              <a:rPr lang="en-US" dirty="0" smtClean="0"/>
-              <a:t>2-issue in-order superscalar, 2</a:t>
-            </a:r>
-            <a:r>
-              <a:rPr lang="en-US" baseline="30000" dirty="0" smtClean="0"/>
-              <a:t>N</a:t>
-            </a:r>
-            <a:r>
-              <a:rPr lang="en-US" dirty="0" smtClean="0"/>
-              <a:t> HW threads (N≥3)</a:t>
-            </a:r>
-          </a:p>
-          <a:p>
-            <a:r>
-              <a:rPr lang="en-US" dirty="0" smtClean="0"/>
-              <a:t>Set-associative L1 cache, partitioned per thread</a:t>
-            </a:r>
-          </a:p>
-          <a:p>
-            <a:r>
-              <a:rPr lang="en-US" dirty="0" smtClean="0"/>
-              <a:t>Hardware ELF loader w/ code signing</a:t>
-            </a:r>
-          </a:p>
-          <a:p>
-            <a:pPr lvl="1"/>
-            <a:r>
-              <a:rPr lang="en-US" dirty="0" smtClean="0"/>
-              <a:t>HMAC-SHA256 for prototype to save FPGA resources</a:t>
-            </a:r>
-          </a:p>
-          <a:p>
-            <a:pPr lvl="1"/>
-            <a:r>
-              <a:rPr lang="en-US" dirty="0" smtClean="0"/>
-              <a:t>Will use RSA or ECC in real system</a:t>
-            </a:r>
+              <a:t>vuln</a:t>
+            </a:r>
+            <a:r>
+              <a:rPr lang="en-US" dirty="0" smtClean="0"/>
+              <a:t> in a node you don’t depend on has </a:t>
+            </a:r>
+            <a:r>
+              <a:rPr lang="en-US" i="1" dirty="0" smtClean="0"/>
+              <a:t>zero</a:t>
+            </a:r>
+            <a:r>
+              <a:rPr lang="en-US" dirty="0" smtClean="0"/>
+              <a:t> impact on your app’s security</a:t>
+            </a:r>
+            <a:endParaRPr lang="en-US" dirty="0"/>
           </a:p>
         </p:txBody>
       </p:sp>
     </p:spTree>
     <p:extLst>
       <p:ext uri="{BB962C8B-B14F-4D97-AF65-F5344CB8AC3E}">
-        <p14:creationId xmlns:p14="http://schemas.microsoft.com/office/powerpoint/2010/main" val="3503198239"/>
+        <p14:creationId xmlns:p14="http://schemas.microsoft.com/office/powerpoint/2010/main" val="1272722905"/>
       </p:ext>
     </p:extLst>
   </p:cSld>
@@ -6491,7 +7954,7 @@
           <a:p>
             <a:r>
               <a:rPr lang="en-US" dirty="0" smtClean="0"/>
-              <a:t>Name server</a:t>
+              <a:t>SARATOGA CPU</a:t>
             </a:r>
             <a:endParaRPr lang="en-US" dirty="0"/>
           </a:p>
@@ -6514,35 +7977,92 @@
           <a:p>
             <a:r>
               <a:rPr lang="en-US" dirty="0" smtClean="0"/>
-              <a:t>Resolve 8-char hostnames to 16-bit addresses</a:t>
-            </a:r>
-          </a:p>
-          <a:p>
-            <a:r>
-              <a:rPr lang="en-US" dirty="0" smtClean="0"/>
-              <a:t>ROM of hard IP locations</a:t>
-            </a:r>
-          </a:p>
-          <a:p>
-            <a:r>
-              <a:rPr lang="en-US" dirty="0" smtClean="0"/>
-              <a:t>Writable memory for software apps</a:t>
+              <a:t>Compatible with </a:t>
+            </a:r>
+            <a:r>
+              <a:rPr lang="en-US" dirty="0" err="1" smtClean="0"/>
+              <a:t>mips</a:t>
+            </a:r>
+            <a:r>
+              <a:rPr lang="en-US" dirty="0" smtClean="0"/>
+              <a:t> GCC but not full MIPS</a:t>
+            </a:r>
+          </a:p>
+          <a:p>
+            <a:r>
+              <a:rPr lang="en-US" dirty="0" smtClean="0"/>
+              <a:t>8 stage barrel processor, 200 MHz on Artix-7</a:t>
             </a:r>
           </a:p>
           <a:p>
             <a:pPr lvl="1"/>
             <a:r>
               <a:rPr lang="en-US" dirty="0" smtClean="0"/>
-              <a:t>Signed updates to ensure authenticity</a:t>
-            </a:r>
-            <a:endParaRPr lang="en-US" dirty="0"/>
+              <a:t>2 cycles each </a:t>
+            </a:r>
+            <a:r>
+              <a:rPr lang="en-US" dirty="0" err="1" smtClean="0"/>
+              <a:t>i</a:t>
+            </a:r>
+            <a:r>
+              <a:rPr lang="en-US" dirty="0" smtClean="0"/>
+              <a:t>-fetch, r-fetch</a:t>
+            </a:r>
+            <a:endParaRPr lang="en-US" dirty="0" smtClean="0"/>
+          </a:p>
+          <a:p>
+            <a:pPr lvl="1"/>
+            <a:r>
+              <a:rPr lang="en-US" dirty="0" smtClean="0"/>
+              <a:t>4 cycles execution</a:t>
+            </a:r>
+          </a:p>
+          <a:p>
+            <a:r>
+              <a:rPr lang="en-US" dirty="0" smtClean="0"/>
+              <a:t>2-issue in-order superscalar, 2</a:t>
+            </a:r>
+            <a:r>
+              <a:rPr lang="en-US" baseline="30000" dirty="0" smtClean="0"/>
+              <a:t>N</a:t>
+            </a:r>
+            <a:r>
+              <a:rPr lang="en-US" dirty="0" smtClean="0"/>
+              <a:t> HW threads (N≥3)</a:t>
+            </a:r>
+          </a:p>
+          <a:p>
+            <a:r>
+              <a:rPr lang="en-US" dirty="0" smtClean="0"/>
+              <a:t>Set-associative L1 cache, partitioned per thread</a:t>
+            </a:r>
+          </a:p>
+          <a:p>
+            <a:r>
+              <a:rPr lang="en-US" dirty="0" smtClean="0"/>
+              <a:t>Hardware ELF loader w/ code signing</a:t>
+            </a:r>
+          </a:p>
+          <a:p>
+            <a:pPr lvl="1"/>
+            <a:r>
+              <a:rPr lang="en-US" dirty="0" smtClean="0"/>
+              <a:t>HMAC-SHA256 for prototype to save FPGA resources</a:t>
+            </a:r>
+          </a:p>
+          <a:p>
+            <a:pPr lvl="1"/>
+            <a:r>
+              <a:rPr lang="en-US" dirty="0" smtClean="0"/>
+              <a:t>Will use RSA or ECC in real system</a:t>
+            </a:r>
           </a:p>
         </p:txBody>
       </p:sp>
     </p:spTree>
     <p:extLst>
       <p:ext uri="{BB962C8B-B14F-4D97-AF65-F5344CB8AC3E}">
-        <p14:creationId xmlns:p14="http://schemas.microsoft.com/office/powerpoint/2010/main" val="526037101"/>
+        <p14:creationId xmlns:p14="http://schemas.microsoft.com/office/powerpoint/2010/main" val="3503198239"/>
       </p:ext>
     </p:extLst>
   </p:cSld>
@@ -6593,7 +8113,7 @@
           <a:p>
             <a:r>
               <a:rPr lang="en-US" dirty="0" smtClean="0"/>
-              <a:t>Prototype implementation</a:t>
+              <a:t>Name server</a:t>
             </a:r>
             <a:endParaRPr lang="en-US" dirty="0"/>
           </a:p>
@@ -6616,99 +8136,26 @@
           <a:p>
             <a:r>
               <a:rPr lang="en-US" dirty="0" smtClean="0"/>
-              <a:t>~187 </a:t>
-            </a:r>
-            <a:r>
-              <a:rPr lang="en-US" dirty="0" err="1" smtClean="0"/>
-              <a:t>kLine</a:t>
-            </a:r>
-            <a:r>
-              <a:rPr lang="en-US" dirty="0" smtClean="0"/>
-              <a:t> including </a:t>
-            </a:r>
-            <a:r>
-              <a:rPr lang="en-US" dirty="0" smtClean="0"/>
-              <a:t>test cases, build tools, </a:t>
-            </a:r>
-            <a:r>
-              <a:rPr lang="en-US" dirty="0" err="1" smtClean="0"/>
-              <a:t>etc</a:t>
-            </a:r>
-            <a:endParaRPr lang="en-US" dirty="0" smtClean="0"/>
-          </a:p>
-          <a:p>
-            <a:r>
-              <a:rPr lang="en-US" dirty="0" smtClean="0"/>
-              <a:t>Critical stuff is </a:t>
-            </a:r>
-            <a:r>
-              <a:rPr lang="en-US" dirty="0" smtClean="0"/>
-              <a:t>small</a:t>
-            </a:r>
-            <a:endParaRPr lang="en-US" dirty="0" smtClean="0"/>
+              <a:t>Resolve 8-char hostnames to 16-bit addresses</a:t>
+            </a:r>
+          </a:p>
+          <a:p>
+            <a:r>
+              <a:rPr lang="en-US" dirty="0" smtClean="0"/>
+              <a:t>ROM of hard IP locations</a:t>
+            </a:r>
+          </a:p>
+          <a:p>
+            <a:r>
+              <a:rPr lang="en-US" dirty="0" smtClean="0"/>
+              <a:t>Writable memory for software apps</a:t>
+            </a:r>
           </a:p>
           <a:p>
             <a:pPr lvl="1"/>
             <a:r>
               <a:rPr lang="en-US" dirty="0" smtClean="0"/>
-              <a:t>RPC/DMA networks combined 4.5 </a:t>
-            </a:r>
-            <a:r>
-              <a:rPr lang="en-US" dirty="0" err="1"/>
-              <a:t>kLine</a:t>
-            </a:r>
-            <a:r>
-              <a:rPr lang="en-US" dirty="0"/>
-              <a:t> </a:t>
-            </a:r>
-            <a:endParaRPr lang="en-US" dirty="0" smtClean="0"/>
-          </a:p>
-          <a:p>
-            <a:pPr lvl="1"/>
-            <a:r>
-              <a:rPr lang="en-US" dirty="0" smtClean="0"/>
-              <a:t>Name server 1 </a:t>
-            </a:r>
-            <a:r>
-              <a:rPr lang="en-US" dirty="0" err="1"/>
-              <a:t>kLine</a:t>
-            </a:r>
-            <a:r>
-              <a:rPr lang="en-US" dirty="0"/>
-              <a:t> </a:t>
-            </a:r>
-            <a:endParaRPr lang="en-US" dirty="0" smtClean="0"/>
-          </a:p>
-          <a:p>
-            <a:pPr lvl="1"/>
-            <a:r>
-              <a:rPr lang="en-US" dirty="0" smtClean="0"/>
-              <a:t>SARATOGA CPU 9 </a:t>
-            </a:r>
-            <a:r>
-              <a:rPr lang="en-US" dirty="0" err="1"/>
-              <a:t>kLine</a:t>
-            </a:r>
-            <a:r>
-              <a:rPr lang="en-US" dirty="0"/>
-              <a:t> </a:t>
-            </a:r>
-            <a:endParaRPr lang="en-US" dirty="0" smtClean="0"/>
-          </a:p>
-          <a:p>
-            <a:r>
-              <a:rPr lang="en-US" dirty="0" smtClean="0"/>
-              <a:t>All code is F/OSS (3-clause BSD)</a:t>
-            </a:r>
-          </a:p>
-          <a:p>
-            <a:r>
-              <a:rPr lang="en-US" dirty="0" smtClean="0"/>
-              <a:t>Goal is to encourage reproduction of results, industry/academic research, </a:t>
-            </a:r>
-            <a:r>
-              <a:rPr lang="en-US" dirty="0" err="1" smtClean="0"/>
-              <a:t>etc</a:t>
+              <a:t>Signed updates to ensure authenticity</a:t>
             </a:r>
             <a:endParaRPr lang="en-US" dirty="0"/>
           </a:p>
@@ -6717,7 +8164,7 @@
     </p:spTree>
     <p:extLst>
       <p:ext uri="{BB962C8B-B14F-4D97-AF65-F5344CB8AC3E}">
-        <p14:creationId xmlns:p14="http://schemas.microsoft.com/office/powerpoint/2010/main" val="3696707441"/>
+        <p14:creationId xmlns:p14="http://schemas.microsoft.com/office/powerpoint/2010/main" val="526037101"/>
       </p:ext>
     </p:extLst>
   </p:cSld>
@@ -6768,6 +8215,181 @@
           <a:p>
             <a:r>
               <a:rPr lang="en-US" dirty="0" smtClean="0"/>
+              <a:t>Prototype implementation</a:t>
+            </a:r>
+            <a:endParaRPr lang="en-US" dirty="0"/>
+          </a:p>
+        </p:txBody>
+      </p:sp>
+      <p:sp>
+        <p:nvSpPr>
+          <p:cNvPr id="3" name="Content Placeholder 2"/>
+          <p:cNvSpPr>
+            <a:spLocks noGrp="1"/>
+          </p:cNvSpPr>
+          <p:nvPr>
+            <p:ph idx="1"/>
+          </p:nvPr>
+        </p:nvSpPr>
+        <p:spPr/>
+        <p:txBody>
+          <a:bodyPr/>
+          <a:lstStyle/>
+          <a:p>
+            <a:r>
+              <a:rPr lang="en-US" dirty="0" smtClean="0"/>
+              <a:t>~187 </a:t>
+            </a:r>
+            <a:r>
+              <a:rPr lang="en-US" dirty="0" err="1" smtClean="0"/>
+              <a:t>kLine</a:t>
+            </a:r>
+            <a:r>
+              <a:rPr lang="en-US" dirty="0" smtClean="0"/>
+              <a:t> including </a:t>
+            </a:r>
+            <a:r>
+              <a:rPr lang="en-US" dirty="0" smtClean="0"/>
+              <a:t>test cases, build tools, </a:t>
+            </a:r>
+            <a:r>
+              <a:rPr lang="en-US" dirty="0" err="1" smtClean="0"/>
+              <a:t>etc</a:t>
+            </a:r>
+            <a:endParaRPr lang="en-US" dirty="0" smtClean="0"/>
+          </a:p>
+          <a:p>
+            <a:r>
+              <a:rPr lang="en-US" dirty="0" smtClean="0"/>
+              <a:t>Critical stuff is </a:t>
+            </a:r>
+            <a:r>
+              <a:rPr lang="en-US" dirty="0" smtClean="0"/>
+              <a:t>small</a:t>
+            </a:r>
+            <a:endParaRPr lang="en-US" dirty="0" smtClean="0"/>
+          </a:p>
+          <a:p>
+            <a:pPr lvl="1"/>
+            <a:r>
+              <a:rPr lang="en-US" dirty="0" smtClean="0"/>
+              <a:t>RPC/DMA networks combined 4.5 </a:t>
+            </a:r>
+            <a:r>
+              <a:rPr lang="en-US" dirty="0" err="1"/>
+              <a:t>kLine</a:t>
+            </a:r>
+            <a:r>
+              <a:rPr lang="en-US" dirty="0"/>
+              <a:t> </a:t>
+            </a:r>
+            <a:endParaRPr lang="en-US" dirty="0" smtClean="0"/>
+          </a:p>
+          <a:p>
+            <a:pPr lvl="1"/>
+            <a:r>
+              <a:rPr lang="en-US" dirty="0" smtClean="0"/>
+              <a:t>Name server 1 </a:t>
+            </a:r>
+            <a:r>
+              <a:rPr lang="en-US" dirty="0" err="1"/>
+              <a:t>kLine</a:t>
+            </a:r>
+            <a:r>
+              <a:rPr lang="en-US" dirty="0"/>
+              <a:t> </a:t>
+            </a:r>
+            <a:endParaRPr lang="en-US" dirty="0" smtClean="0"/>
+          </a:p>
+          <a:p>
+            <a:pPr lvl="1"/>
+            <a:r>
+              <a:rPr lang="en-US" dirty="0" smtClean="0"/>
+              <a:t>SARATOGA CPU 9 </a:t>
+            </a:r>
+            <a:r>
+              <a:rPr lang="en-US" dirty="0" err="1"/>
+              <a:t>kLine</a:t>
+            </a:r>
+            <a:r>
+              <a:rPr lang="en-US" dirty="0"/>
+              <a:t> </a:t>
+            </a:r>
+            <a:endParaRPr lang="en-US" dirty="0" smtClean="0"/>
+          </a:p>
+          <a:p>
+            <a:r>
+              <a:rPr lang="en-US" dirty="0" smtClean="0"/>
+              <a:t>All code is F/OSS (3-clause BSD)</a:t>
+            </a:r>
+          </a:p>
+          <a:p>
+            <a:r>
+              <a:rPr lang="en-US" dirty="0" smtClean="0"/>
+              <a:t>Goal is to encourage reproduction of results, industry/academic research, </a:t>
+            </a:r>
+            <a:r>
+              <a:rPr lang="en-US" dirty="0" err="1" smtClean="0"/>
+              <a:t>etc</a:t>
+            </a:r>
+            <a:endParaRPr lang="en-US" dirty="0"/>
+          </a:p>
+        </p:txBody>
+      </p:sp>
+    </p:spTree>
+    <p:extLst>
+      <p:ext uri="{BB962C8B-B14F-4D97-AF65-F5344CB8AC3E}">
+        <p14:creationId xmlns:p14="http://schemas.microsoft.com/office/powerpoint/2010/main" val="3696707441"/>
+      </p:ext>
+    </p:extLst>
+  </p:cSld>
+  <p:clrMapOvr>
+    <a:masterClrMapping/>
+  </p:clrMapOvr>
+  <p:timing>
+    <p:tnLst>
+      <p:par>
+        <p:cTn id="1" dur="indefinite" restart="never" nodeType="tmRoot"/>
+      </p:par>
+    </p:tnLst>
+  </p:timing>
+</p:sld>
+</file>
+
+<file path=ppt/slides/slide23.xml><?xml version="1.0" encoding="utf-8"?>
+<p:sld xmlns:a="http://schemas.openxmlformats.org/drawingml/2006/main" xmlns:r="http://schemas.openxmlformats.org/officeDocument/2006/relationships" xmlns:p="http://schemas.openxmlformats.org/presentationml/2006/main">
+  <p:cSld>
+    <p:spTree>
+      <p:nvGrpSpPr>
+        <p:cNvPr id="1" name=""/>
+        <p:cNvGrpSpPr/>
+        <p:nvPr/>
+      </p:nvGrpSpPr>
+      <p:grpSpPr>
+        <a:xfrm>
+          <a:off x="0" y="0"/>
+          <a:ext cx="0" cy="0"/>
+          <a:chOff x="0" y="0"/>
+          <a:chExt cx="0" cy="0"/>
+        </a:xfrm>
+      </p:grpSpPr>
+      <p:sp>
+        <p:nvSpPr>
+          <p:cNvPr id="2" name="Title 1"/>
+          <p:cNvSpPr>
+            <a:spLocks noGrp="1"/>
+          </p:cNvSpPr>
+          <p:nvPr>
+            <p:ph type="title"/>
+          </p:nvPr>
+        </p:nvSpPr>
+        <p:spPr/>
+        <p:txBody>
+          <a:bodyPr/>
+          <a:lstStyle/>
+          <a:p>
+            <a:r>
+              <a:rPr lang="en-US" dirty="0" smtClean="0"/>
               <a:t>Future work</a:t>
             </a:r>
             <a:endParaRPr lang="en-US" dirty="0"/>
@@ -6835,7 +8457,7 @@
 </p:sld>
 </file>
 
-<file path=ppt/slides/slide23.xml><?xml version="1.0" encoding="utf-8"?>
+<file path=ppt/slides/slide24.xml><?xml version="1.0" encoding="utf-8"?>
 <p:sld xmlns:a="http://schemas.openxmlformats.org/drawingml/2006/main" xmlns:r="http://schemas.openxmlformats.org/officeDocument/2006/relationships" xmlns:p="http://schemas.openxmlformats.org/presentationml/2006/main">
   <p:cSld>
     <p:spTree>
@@ -7392,57 +9014,376 @@
             </a:r>
             <a:r>
               <a:rPr lang="en-US" dirty="0" smtClean="0"/>
-              <a:t>from abstraction</a:t>
-            </a:r>
-          </a:p>
-          <a:p>
-            <a:r>
-              <a:rPr lang="en-US" dirty="0" smtClean="0"/>
-              <a:t>OS does very little:</a:t>
-            </a:r>
-          </a:p>
-          <a:p>
-            <a:pPr lvl="1"/>
-            <a:r>
-              <a:rPr lang="en-US" dirty="0" smtClean="0"/>
-              <a:t>Divide resources into blocks</a:t>
-            </a:r>
-            <a:br>
-              <a:rPr lang="en-US" dirty="0" smtClean="0"/>
-            </a:br>
-            <a:r>
-              <a:rPr lang="en-US" dirty="0" smtClean="0"/>
-              <a:t>(CPU time quanta, RAM pages…)</a:t>
-            </a:r>
-          </a:p>
-          <a:p>
-            <a:pPr lvl="1"/>
-            <a:r>
-              <a:rPr lang="en-US" dirty="0" smtClean="0"/>
-              <a:t>Provide controlled access to them</a:t>
-            </a:r>
-          </a:p>
-          <a:p>
-            <a:r>
-              <a:rPr lang="en-US" dirty="0" smtClean="0"/>
-              <a:t>Drivers can be microkernel-</a:t>
-            </a:r>
-            <a:r>
-              <a:rPr lang="en-US" dirty="0" err="1" smtClean="0"/>
-              <a:t>esque</a:t>
-            </a:r>
-            <a:r>
-              <a:rPr lang="en-US" dirty="0" smtClean="0"/>
-              <a:t> </a:t>
-            </a:r>
-            <a:r>
-              <a:rPr lang="en-US" dirty="0" smtClean="0"/>
-              <a:t>servers</a:t>
+              <a:t>from </a:t>
+            </a:r>
+            <a:r>
+              <a:rPr lang="en-US" dirty="0" smtClean="0"/>
+              <a:t>abstraction</a:t>
             </a:r>
             <a:endParaRPr lang="en-US" dirty="0" smtClean="0"/>
           </a:p>
         </p:txBody>
       </p:sp>
+      <p:sp>
+        <p:nvSpPr>
+          <p:cNvPr id="5" name="Rounded Rectangle 4"/>
+          <p:cNvSpPr/>
+          <p:nvPr/>
+        </p:nvSpPr>
+        <p:spPr>
+          <a:xfrm>
+            <a:off x="2915643" y="2769232"/>
+            <a:ext cx="711543" cy="356318"/>
+          </a:xfrm>
+          <a:prstGeom prst="roundRect">
+            <a:avLst/>
+          </a:prstGeom>
+        </p:spPr>
+        <p:style>
+          <a:lnRef idx="1">
+            <a:schemeClr val="accent6"/>
+          </a:lnRef>
+          <a:fillRef idx="2">
+            <a:schemeClr val="accent6"/>
+          </a:fillRef>
+          <a:effectRef idx="1">
+            <a:schemeClr val="accent6"/>
+          </a:effectRef>
+          <a:fontRef idx="minor">
+            <a:schemeClr val="dk1"/>
+          </a:fontRef>
+        </p:style>
+        <p:txBody>
+          <a:bodyPr rtlCol="0" anchor="ctr"/>
+          <a:lstStyle/>
+          <a:p>
+            <a:pPr algn="ctr"/>
+            <a:r>
+              <a:rPr lang="en-US" dirty="0" smtClean="0"/>
+              <a:t>FS</a:t>
+            </a:r>
+            <a:endParaRPr lang="en-US" dirty="0"/>
+          </a:p>
+        </p:txBody>
+      </p:sp>
+      <p:sp>
+        <p:nvSpPr>
+          <p:cNvPr id="6" name="Rounded Rectangle 5"/>
+          <p:cNvSpPr/>
+          <p:nvPr/>
+        </p:nvSpPr>
+        <p:spPr>
+          <a:xfrm>
+            <a:off x="4256829" y="2769232"/>
+            <a:ext cx="990600" cy="356318"/>
+          </a:xfrm>
+          <a:prstGeom prst="roundRect">
+            <a:avLst/>
+          </a:prstGeom>
+        </p:spPr>
+        <p:style>
+          <a:lnRef idx="1">
+            <a:schemeClr val="accent6"/>
+          </a:lnRef>
+          <a:fillRef idx="2">
+            <a:schemeClr val="accent6"/>
+          </a:fillRef>
+          <a:effectRef idx="1">
+            <a:schemeClr val="accent6"/>
+          </a:effectRef>
+          <a:fontRef idx="minor">
+            <a:schemeClr val="dk1"/>
+          </a:fontRef>
+        </p:style>
+        <p:txBody>
+          <a:bodyPr rtlCol="0" anchor="ctr"/>
+          <a:lstStyle/>
+          <a:p>
+            <a:pPr algn="ctr"/>
+            <a:r>
+              <a:rPr lang="en-US" dirty="0" smtClean="0"/>
+              <a:t>Cache</a:t>
+            </a:r>
+            <a:endParaRPr lang="en-US" dirty="0"/>
+          </a:p>
+        </p:txBody>
+      </p:sp>
+      <p:sp>
+        <p:nvSpPr>
+          <p:cNvPr id="7" name="Rounded Rectangle 6"/>
+          <p:cNvSpPr/>
+          <p:nvPr/>
+        </p:nvSpPr>
+        <p:spPr>
+          <a:xfrm>
+            <a:off x="6954243" y="2769232"/>
+            <a:ext cx="1497320" cy="356318"/>
+          </a:xfrm>
+          <a:prstGeom prst="roundRect">
+            <a:avLst/>
+          </a:prstGeom>
+        </p:spPr>
+        <p:style>
+          <a:lnRef idx="1">
+            <a:schemeClr val="accent6"/>
+          </a:lnRef>
+          <a:fillRef idx="2">
+            <a:schemeClr val="accent6"/>
+          </a:fillRef>
+          <a:effectRef idx="1">
+            <a:schemeClr val="accent6"/>
+          </a:effectRef>
+          <a:fontRef idx="minor">
+            <a:schemeClr val="dk1"/>
+          </a:fontRef>
+        </p:style>
+        <p:txBody>
+          <a:bodyPr rtlCol="0" anchor="ctr"/>
+          <a:lstStyle/>
+          <a:p>
+            <a:pPr algn="ctr"/>
+            <a:r>
+              <a:rPr lang="en-US" dirty="0" smtClean="0"/>
+              <a:t>Disk driver</a:t>
+            </a:r>
+            <a:endParaRPr lang="en-US" dirty="0"/>
+          </a:p>
+        </p:txBody>
+      </p:sp>
+      <p:sp>
+        <p:nvSpPr>
+          <p:cNvPr id="8" name="Rounded Rectangle 7"/>
+          <p:cNvSpPr/>
+          <p:nvPr/>
+        </p:nvSpPr>
+        <p:spPr>
+          <a:xfrm>
+            <a:off x="838200" y="2769232"/>
+            <a:ext cx="1447800" cy="356318"/>
+          </a:xfrm>
+          <a:prstGeom prst="roundRect">
+            <a:avLst/>
+          </a:prstGeom>
+        </p:spPr>
+        <p:style>
+          <a:lnRef idx="1">
+            <a:schemeClr val="accent6"/>
+          </a:lnRef>
+          <a:fillRef idx="2">
+            <a:schemeClr val="accent6"/>
+          </a:fillRef>
+          <a:effectRef idx="1">
+            <a:schemeClr val="accent6"/>
+          </a:effectRef>
+          <a:fontRef idx="minor">
+            <a:schemeClr val="dk1"/>
+          </a:fontRef>
+        </p:style>
+        <p:txBody>
+          <a:bodyPr rtlCol="0" anchor="ctr"/>
+          <a:lstStyle/>
+          <a:p>
+            <a:pPr algn="ctr"/>
+            <a:r>
+              <a:rPr lang="en-US" dirty="0" smtClean="0"/>
+              <a:t>Word proc</a:t>
+            </a:r>
+            <a:endParaRPr lang="en-US" dirty="0"/>
+          </a:p>
+        </p:txBody>
+      </p:sp>
+      <p:cxnSp>
+        <p:nvCxnSpPr>
+          <p:cNvPr id="10" name="Elbow Connector 9"/>
+          <p:cNvCxnSpPr>
+            <a:stCxn id="8" idx="3"/>
+            <a:endCxn id="5" idx="1"/>
+          </p:cNvCxnSpPr>
+          <p:nvPr/>
+        </p:nvCxnSpPr>
+        <p:spPr>
+          <a:xfrm>
+            <a:off x="2286000" y="2947391"/>
+            <a:ext cx="629643" cy="12700"/>
+          </a:xfrm>
+          <a:prstGeom prst="bentConnector3">
+            <a:avLst/>
+          </a:prstGeom>
+          <a:ln>
+            <a:headEnd type="triangle"/>
+            <a:tailEnd type="triangle"/>
+          </a:ln>
+        </p:spPr>
+        <p:style>
+          <a:lnRef idx="2">
+            <a:schemeClr val="accent4"/>
+          </a:lnRef>
+          <a:fillRef idx="0">
+            <a:schemeClr val="accent4"/>
+          </a:fillRef>
+          <a:effectRef idx="1">
+            <a:schemeClr val="accent4"/>
+          </a:effectRef>
+          <a:fontRef idx="minor">
+            <a:schemeClr val="tx1"/>
+          </a:fontRef>
+        </p:style>
+      </p:cxnSp>
+      <p:cxnSp>
+        <p:nvCxnSpPr>
+          <p:cNvPr id="15" name="Elbow Connector 14"/>
+          <p:cNvCxnSpPr>
+            <a:stCxn id="5" idx="3"/>
+            <a:endCxn id="6" idx="1"/>
+          </p:cNvCxnSpPr>
+          <p:nvPr/>
+        </p:nvCxnSpPr>
+        <p:spPr>
+          <a:xfrm>
+            <a:off x="3627186" y="2947391"/>
+            <a:ext cx="629643" cy="12700"/>
+          </a:xfrm>
+          <a:prstGeom prst="bentConnector3">
+            <a:avLst>
+              <a:gd name="adj1" fmla="val 50000"/>
+            </a:avLst>
+          </a:prstGeom>
+          <a:ln>
+            <a:headEnd type="triangle"/>
+            <a:tailEnd type="triangle"/>
+          </a:ln>
+        </p:spPr>
+        <p:style>
+          <a:lnRef idx="2">
+            <a:schemeClr val="accent4"/>
+          </a:lnRef>
+          <a:fillRef idx="0">
+            <a:schemeClr val="accent4"/>
+          </a:fillRef>
+          <a:effectRef idx="1">
+            <a:schemeClr val="accent4"/>
+          </a:effectRef>
+          <a:fontRef idx="minor">
+            <a:schemeClr val="tx1"/>
+          </a:fontRef>
+        </p:style>
+      </p:cxnSp>
+      <p:cxnSp>
+        <p:nvCxnSpPr>
+          <p:cNvPr id="19" name="Elbow Connector 18"/>
+          <p:cNvCxnSpPr>
+            <a:stCxn id="6" idx="3"/>
+            <a:endCxn id="7" idx="1"/>
+          </p:cNvCxnSpPr>
+          <p:nvPr/>
+        </p:nvCxnSpPr>
+        <p:spPr>
+          <a:xfrm>
+            <a:off x="5247429" y="2947391"/>
+            <a:ext cx="1706814" cy="12700"/>
+          </a:xfrm>
+          <a:prstGeom prst="bentConnector3">
+            <a:avLst/>
+          </a:prstGeom>
+          <a:ln>
+            <a:headEnd type="triangle"/>
+            <a:tailEnd type="triangle"/>
+          </a:ln>
+        </p:spPr>
+        <p:style>
+          <a:lnRef idx="2">
+            <a:schemeClr val="accent4"/>
+          </a:lnRef>
+          <a:fillRef idx="0">
+            <a:schemeClr val="accent4"/>
+          </a:fillRef>
+          <a:effectRef idx="1">
+            <a:schemeClr val="accent4"/>
+          </a:effectRef>
+          <a:fontRef idx="minor">
+            <a:schemeClr val="tx1"/>
+          </a:fontRef>
+        </p:style>
+      </p:cxnSp>
+      <p:sp>
+        <p:nvSpPr>
+          <p:cNvPr id="22" name="Rounded Rectangle 21"/>
+          <p:cNvSpPr/>
+          <p:nvPr/>
+        </p:nvSpPr>
+        <p:spPr>
+          <a:xfrm>
+            <a:off x="838200" y="3406732"/>
+            <a:ext cx="1600200" cy="384218"/>
+          </a:xfrm>
+          <a:prstGeom prst="roundRect">
+            <a:avLst/>
+          </a:prstGeom>
+        </p:spPr>
+        <p:style>
+          <a:lnRef idx="1">
+            <a:schemeClr val="accent6"/>
+          </a:lnRef>
+          <a:fillRef idx="2">
+            <a:schemeClr val="accent6"/>
+          </a:fillRef>
+          <a:effectRef idx="1">
+            <a:schemeClr val="accent6"/>
+          </a:effectRef>
+          <a:fontRef idx="minor">
+            <a:schemeClr val="dk1"/>
+          </a:fontRef>
+        </p:style>
+        <p:txBody>
+          <a:bodyPr rtlCol="0" anchor="ctr"/>
+          <a:lstStyle/>
+          <a:p>
+            <a:pPr algn="ctr"/>
+            <a:r>
+              <a:rPr lang="en-US" dirty="0" smtClean="0"/>
+              <a:t>DHCP server</a:t>
+            </a:r>
+            <a:endParaRPr lang="en-US" dirty="0"/>
+          </a:p>
+        </p:txBody>
+      </p:sp>
+      <p:cxnSp>
+        <p:nvCxnSpPr>
+          <p:cNvPr id="23" name="Elbow Connector 22"/>
+          <p:cNvCxnSpPr>
+            <a:stCxn id="22" idx="3"/>
+            <a:endCxn id="7" idx="2"/>
+          </p:cNvCxnSpPr>
+          <p:nvPr/>
+        </p:nvCxnSpPr>
+        <p:spPr>
+          <a:xfrm flipV="1">
+            <a:off x="2438400" y="3125550"/>
+            <a:ext cx="5264503" cy="473291"/>
+          </a:xfrm>
+          <a:prstGeom prst="bentConnector2">
+            <a:avLst/>
+          </a:prstGeom>
+          <a:ln>
+            <a:headEnd type="triangle"/>
+            <a:tailEnd type="triangle"/>
+          </a:ln>
+        </p:spPr>
+        <p:style>
+          <a:lnRef idx="2">
+            <a:schemeClr val="accent4"/>
+          </a:lnRef>
+          <a:fillRef idx="0">
+            <a:schemeClr val="accent4"/>
+          </a:fillRef>
+          <a:effectRef idx="1">
+            <a:schemeClr val="accent4"/>
+          </a:effectRef>
+          <a:fontRef idx="minor">
+            <a:schemeClr val="tx1"/>
+          </a:fontRef>
+        </p:style>
+      </p:cxnSp>
     </p:spTree>
     <p:extLst>
       <p:ext uri="{BB962C8B-B14F-4D97-AF65-F5344CB8AC3E}">
@@ -7496,6 +9437,114 @@
           <a:lstStyle/>
           <a:p>
             <a:r>
+              <a:rPr lang="en-US" dirty="0" err="1"/>
+              <a:t>Exokernel</a:t>
+            </a:r>
+            <a:r>
+              <a:rPr lang="en-US" dirty="0"/>
+              <a:t> (MIT, 1995)</a:t>
+            </a:r>
+          </a:p>
+        </p:txBody>
+      </p:sp>
+      <p:sp>
+        <p:nvSpPr>
+          <p:cNvPr id="3" name="Content Placeholder 2"/>
+          <p:cNvSpPr>
+            <a:spLocks noGrp="1"/>
+          </p:cNvSpPr>
+          <p:nvPr>
+            <p:ph idx="1"/>
+          </p:nvPr>
+        </p:nvSpPr>
+        <p:spPr/>
+        <p:txBody>
+          <a:bodyPr/>
+          <a:lstStyle/>
+          <a:p>
+            <a:r>
+              <a:rPr lang="en-US" dirty="0" smtClean="0"/>
+              <a:t>OS does very little:</a:t>
+            </a:r>
+          </a:p>
+          <a:p>
+            <a:pPr lvl="1"/>
+            <a:r>
+              <a:rPr lang="en-US" dirty="0" smtClean="0"/>
+              <a:t>Divide resources into blocks </a:t>
+            </a:r>
+            <a:br>
+              <a:rPr lang="en-US" dirty="0" smtClean="0"/>
+            </a:br>
+            <a:r>
+              <a:rPr lang="en-US" dirty="0" smtClean="0"/>
+              <a:t>(CPU time quanta, RAM pages…)</a:t>
+            </a:r>
+          </a:p>
+          <a:p>
+            <a:pPr lvl="1"/>
+            <a:r>
+              <a:rPr lang="en-US" dirty="0" smtClean="0"/>
+              <a:t>Provide </a:t>
+            </a:r>
+            <a:r>
+              <a:rPr lang="en-US" dirty="0"/>
+              <a:t>controlled access to </a:t>
+            </a:r>
+            <a:r>
+              <a:rPr lang="en-US" dirty="0" smtClean="0"/>
+              <a:t>them</a:t>
+            </a:r>
+            <a:endParaRPr lang="en-US" dirty="0"/>
+          </a:p>
+        </p:txBody>
+      </p:sp>
+    </p:spTree>
+    <p:extLst>
+      <p:ext uri="{BB962C8B-B14F-4D97-AF65-F5344CB8AC3E}">
+        <p14:creationId xmlns:p14="http://schemas.microsoft.com/office/powerpoint/2010/main" val="1068697150"/>
+      </p:ext>
+    </p:extLst>
+  </p:cSld>
+  <p:clrMapOvr>
+    <a:masterClrMapping/>
+  </p:clrMapOvr>
+</p:sld>
+</file>
+
+<file path=ppt/slides/slide6.xml><?xml version="1.0" encoding="utf-8"?>
+<p:sld xmlns:a="http://schemas.openxmlformats.org/drawingml/2006/main" xmlns:r="http://schemas.openxmlformats.org/officeDocument/2006/relationships" xmlns:p="http://schemas.openxmlformats.org/presentationml/2006/main">
+  <p:cSld>
+    <p:spTree>
+      <p:nvGrpSpPr>
+        <p:cNvPr id="1" name=""/>
+        <p:cNvGrpSpPr/>
+        <p:nvPr/>
+      </p:nvGrpSpPr>
+      <p:grpSpPr>
+        <a:xfrm>
+          <a:off x="0" y="0"/>
+          <a:ext cx="0" cy="0"/>
+          <a:chOff x="0" y="0"/>
+          <a:chExt cx="0" cy="0"/>
+        </a:xfrm>
+      </p:grpSpPr>
+      <p:sp>
+        <p:nvSpPr>
+          <p:cNvPr id="2" name="Title 1"/>
+          <p:cNvSpPr>
+            <a:spLocks noGrp="1"/>
+          </p:cNvSpPr>
+          <p:nvPr>
+            <p:ph type="title"/>
+          </p:nvPr>
+        </p:nvSpPr>
+        <p:spPr/>
+        <p:txBody>
+          <a:bodyPr/>
+          <a:lstStyle/>
+          <a:p>
+            <a:r>
               <a:rPr lang="en-US" dirty="0" smtClean="0"/>
               <a:t>But wait, there’s more…</a:t>
             </a:r>
@@ -7546,7 +9595,7 @@
 </p:sld>
 </file>
 
-<file path=ppt/slides/slide6.xml><?xml version="1.0" encoding="utf-8"?>
+<file path=ppt/slides/slide7.xml><?xml version="1.0" encoding="utf-8"?>
 <p:sld xmlns:a="http://schemas.openxmlformats.org/drawingml/2006/main" xmlns:r="http://schemas.openxmlformats.org/officeDocument/2006/relationships" xmlns:p="http://schemas.openxmlformats.org/presentationml/2006/main">
   <p:cSld>
     <p:spTree>
@@ -7677,7 +9726,7 @@
 </p:sld>
 </file>
 
-<file path=ppt/slides/slide7.xml><?xml version="1.0" encoding="utf-8"?>
+<file path=ppt/slides/slide8.xml><?xml version="1.0" encoding="utf-8"?>
 <p:sld xmlns:a="http://schemas.openxmlformats.org/drawingml/2006/main" xmlns:r="http://schemas.openxmlformats.org/officeDocument/2006/relationships" xmlns:p="http://schemas.openxmlformats.org/presentationml/2006/main">
   <p:cSld>
     <p:spTree>
@@ -8554,138 +10603,6 @@
 </p:sld>
 </file>
 
-<file path=ppt/slides/slide8.xml><?xml version="1.0" encoding="utf-8"?>
-<p:sld xmlns:a="http://schemas.openxmlformats.org/drawingml/2006/main" xmlns:r="http://schemas.openxmlformats.org/officeDocument/2006/relationships" xmlns:p="http://schemas.openxmlformats.org/presentationml/2006/main">
-  <p:cSld>
-    <p:spTree>
-      <p:nvGrpSpPr>
-        <p:cNvPr id="1" name=""/>
-        <p:cNvGrpSpPr/>
-        <p:nvPr/>
-      </p:nvGrpSpPr>
-      <p:grpSpPr>
-        <a:xfrm>
-          <a:off x="0" y="0"/>
-          <a:ext cx="0" cy="0"/>
-          <a:chOff x="0" y="0"/>
-          <a:chExt cx="0" cy="0"/>
-        </a:xfrm>
-      </p:grpSpPr>
-      <p:sp>
-        <p:nvSpPr>
-          <p:cNvPr id="2" name="Title 1"/>
-          <p:cNvSpPr>
-            <a:spLocks noGrp="1"/>
-          </p:cNvSpPr>
-          <p:nvPr>
-            <p:ph type="title"/>
-          </p:nvPr>
-        </p:nvSpPr>
-        <p:spPr/>
-        <p:txBody>
-          <a:bodyPr/>
-          <a:lstStyle/>
-          <a:p>
-            <a:r>
-              <a:rPr lang="en-US" dirty="0" smtClean="0"/>
-              <a:t>Hardware scheduler	</a:t>
-            </a:r>
-            <a:endParaRPr lang="en-US" dirty="0"/>
-          </a:p>
-        </p:txBody>
-      </p:sp>
-      <p:sp>
-        <p:nvSpPr>
-          <p:cNvPr id="3" name="Content Placeholder 2"/>
-          <p:cNvSpPr>
-            <a:spLocks noGrp="1"/>
-          </p:cNvSpPr>
-          <p:nvPr>
-            <p:ph idx="1"/>
-          </p:nvPr>
-        </p:nvSpPr>
-        <p:spPr/>
-        <p:txBody>
-          <a:bodyPr/>
-          <a:lstStyle/>
-          <a:p>
-            <a:r>
-              <a:rPr lang="en-US" dirty="0"/>
-              <a:t>Circular queue </a:t>
-            </a:r>
-            <a:r>
-              <a:rPr lang="en-US" dirty="0" smtClean="0"/>
-              <a:t>of </a:t>
-            </a:r>
-            <a:r>
-              <a:rPr lang="en-US" dirty="0"/>
-              <a:t>thread IDs = round robin </a:t>
-            </a:r>
-            <a:r>
-              <a:rPr lang="en-US" dirty="0" smtClean="0"/>
-              <a:t>scheduler</a:t>
-            </a:r>
-            <a:endParaRPr lang="en-US" dirty="0"/>
-          </a:p>
-          <a:p>
-            <a:r>
-              <a:rPr lang="en-US" dirty="0"/>
-              <a:t>Minimal gate count (one small </a:t>
-            </a:r>
-            <a:r>
-              <a:rPr lang="en-US" dirty="0" err="1"/>
-              <a:t>small</a:t>
-            </a:r>
-            <a:r>
-              <a:rPr lang="en-US" dirty="0"/>
-              <a:t> FIFO)</a:t>
-            </a:r>
-          </a:p>
-          <a:p>
-            <a:r>
-              <a:rPr lang="en-US" dirty="0"/>
-              <a:t>Deterministic performance (good for hard </a:t>
-            </a:r>
-            <a:r>
-              <a:rPr lang="en-US" dirty="0" err="1"/>
-              <a:t>realtime</a:t>
-            </a:r>
-            <a:r>
-              <a:rPr lang="en-US" dirty="0"/>
-              <a:t>)</a:t>
-            </a:r>
-          </a:p>
-          <a:p>
-            <a:r>
-              <a:rPr lang="en-US" dirty="0"/>
-              <a:t>No possibility of corrupting unrelated state</a:t>
-            </a:r>
-          </a:p>
-          <a:p>
-            <a:endParaRPr lang="en-US" dirty="0"/>
-          </a:p>
-        </p:txBody>
-      </p:sp>
-    </p:spTree>
-    <p:extLst>
-      <p:ext uri="{BB962C8B-B14F-4D97-AF65-F5344CB8AC3E}">
-        <p14:creationId xmlns:p14="http://schemas.microsoft.com/office/powerpoint/2010/main" val="1362593794"/>
-      </p:ext>
-    </p:extLst>
-  </p:cSld>
-  <p:clrMapOvr>
-    <a:masterClrMapping/>
-  </p:clrMapOvr>
-  <p:timing>
-    <p:tnLst>
-      <p:par>
-        <p:cTn id="1" dur="indefinite" restart="never" nodeType="tmRoot"/>
-      </p:par>
-    </p:tnLst>
-  </p:timing>
-</p:sld>
-</file>
-
 <file path=ppt/slides/slide9.xml><?xml version="1.0" encoding="utf-8"?>
 <p:sld xmlns:a="http://schemas.openxmlformats.org/drawingml/2006/main" xmlns:r="http://schemas.openxmlformats.org/officeDocument/2006/relationships" xmlns:p="http://schemas.openxmlformats.org/presentationml/2006/main">
   <p:cSld>
@@ -8720,7 +10637,7 @@
           <a:p>
             <a:r>
               <a:rPr lang="en-US" dirty="0" smtClean="0"/>
-              <a:t>Access to hardware</a:t>
+              <a:t>Hardware scheduler	</a:t>
             </a:r>
             <a:endParaRPr lang="en-US" dirty="0"/>
           </a:p>
@@ -8742,558 +10659,66 @@
           <a:lstStyle/>
           <a:p>
             <a:r>
-              <a:rPr lang="en-US" dirty="0" smtClean="0"/>
-              <a:t>Instead of a bus, connect the CPU to rest of the </a:t>
-            </a:r>
-            <a:r>
-              <a:rPr lang="en-US" dirty="0" err="1" smtClean="0"/>
-              <a:t>SoC</a:t>
-            </a:r>
-            <a:r>
-              <a:rPr lang="en-US" dirty="0" smtClean="0"/>
-              <a:t> with a packet-switched </a:t>
-            </a:r>
-            <a:r>
-              <a:rPr lang="en-US" dirty="0" err="1" smtClean="0"/>
-              <a:t>NoC</a:t>
-            </a:r>
-            <a:endParaRPr lang="en-US" dirty="0" smtClean="0"/>
-          </a:p>
-          <a:p>
-            <a:pPr lvl="1"/>
-            <a:r>
-              <a:rPr lang="en-US" dirty="0" smtClean="0"/>
-              <a:t>Assign addresses as</a:t>
-            </a:r>
-            <a:r>
-              <a:rPr lang="en-US" dirty="0" smtClean="0"/>
-              <a:t> {</a:t>
-            </a:r>
-            <a:r>
-              <a:rPr lang="en-US" dirty="0" err="1" smtClean="0"/>
-              <a:t>cpu</a:t>
-            </a:r>
-            <a:r>
-              <a:rPr lang="en-US" dirty="0" smtClean="0"/>
-              <a:t> </a:t>
-            </a:r>
-            <a:r>
-              <a:rPr lang="en-US" dirty="0" smtClean="0"/>
-              <a:t>subnet prefix</a:t>
-            </a:r>
-            <a:r>
-              <a:rPr lang="en-US" dirty="0" smtClean="0"/>
-              <a:t>, </a:t>
-            </a:r>
-            <a:r>
-              <a:rPr lang="en-US" dirty="0" smtClean="0"/>
-              <a:t>PID}</a:t>
-            </a:r>
-            <a:endParaRPr lang="en-US" dirty="0" smtClean="0"/>
-          </a:p>
-        </p:txBody>
-      </p:sp>
-      <p:sp>
-        <p:nvSpPr>
-          <p:cNvPr id="5" name="Rounded Rectangle 4"/>
-          <p:cNvSpPr/>
-          <p:nvPr/>
-        </p:nvSpPr>
-        <p:spPr>
-          <a:xfrm>
-            <a:off x="533400" y="2647950"/>
-            <a:ext cx="2057400" cy="381000"/>
-          </a:xfrm>
-          <a:prstGeom prst="roundRect">
-            <a:avLst/>
-          </a:prstGeom>
-        </p:spPr>
-        <p:style>
-          <a:lnRef idx="1">
-            <a:schemeClr val="accent6"/>
-          </a:lnRef>
-          <a:fillRef idx="2">
-            <a:schemeClr val="accent6"/>
-          </a:fillRef>
-          <a:effectRef idx="1">
-            <a:schemeClr val="accent6"/>
-          </a:effectRef>
-          <a:fontRef idx="minor">
-            <a:schemeClr val="dk1"/>
-          </a:fontRef>
-        </p:style>
-        <p:txBody>
-          <a:bodyPr rtlCol="0" anchor="ctr"/>
-          <a:lstStyle/>
-          <a:p>
-            <a:pPr algn="ctr"/>
-            <a:r>
-              <a:rPr lang="en-US" dirty="0" smtClean="0"/>
-              <a:t>CPU ::8040/10</a:t>
+              <a:rPr lang="en-US" dirty="0"/>
+              <a:t>Circular queue </a:t>
+            </a:r>
+            <a:r>
+              <a:rPr lang="en-US" dirty="0" smtClean="0"/>
+              <a:t>of </a:t>
+            </a:r>
+            <a:r>
+              <a:rPr lang="en-US" dirty="0"/>
+              <a:t>thread IDs = round robin </a:t>
+            </a:r>
+            <a:r>
+              <a:rPr lang="en-US" dirty="0" smtClean="0"/>
+              <a:t>scheduler</a:t>
             </a:r>
             <a:endParaRPr lang="en-US" dirty="0"/>
           </a:p>
-        </p:txBody>
-      </p:sp>
-      <p:sp>
-        <p:nvSpPr>
-          <p:cNvPr id="6" name="Rounded Rectangle 5"/>
-          <p:cNvSpPr/>
-          <p:nvPr/>
-        </p:nvSpPr>
-        <p:spPr>
-          <a:xfrm>
-            <a:off x="1143000" y="3181350"/>
-            <a:ext cx="2057400" cy="304800"/>
-          </a:xfrm>
-          <a:prstGeom prst="roundRect">
-            <a:avLst/>
-          </a:prstGeom>
-        </p:spPr>
-        <p:style>
-          <a:lnRef idx="1">
-            <a:schemeClr val="accent6"/>
-          </a:lnRef>
-          <a:fillRef idx="2">
-            <a:schemeClr val="accent6"/>
-          </a:fillRef>
-          <a:effectRef idx="1">
-            <a:schemeClr val="accent6"/>
-          </a:effectRef>
-          <a:fontRef idx="minor">
-            <a:schemeClr val="dk1"/>
-          </a:fontRef>
-        </p:style>
-        <p:txBody>
-          <a:bodyPr rtlCol="0" anchor="ctr"/>
-          <a:lstStyle/>
-          <a:p>
-            <a:pPr algn="ctr"/>
-            <a:r>
-              <a:rPr lang="en-US" dirty="0" err="1" smtClean="0"/>
-              <a:t>Mgmt</a:t>
-            </a:r>
-            <a:r>
-              <a:rPr lang="en-US" dirty="0" smtClean="0"/>
-              <a:t> ::8040/16</a:t>
-            </a:r>
+          <a:p>
+            <a:r>
+              <a:rPr lang="en-US" dirty="0"/>
+              <a:t>Minimal gate count (one small </a:t>
+            </a:r>
+            <a:r>
+              <a:rPr lang="en-US" dirty="0" err="1"/>
+              <a:t>small</a:t>
+            </a:r>
+            <a:r>
+              <a:rPr lang="en-US" dirty="0"/>
+              <a:t> FIFO)</a:t>
+            </a:r>
+          </a:p>
+          <a:p>
+            <a:r>
+              <a:rPr lang="en-US" dirty="0"/>
+              <a:t>Deterministic performance (good for hard </a:t>
+            </a:r>
+            <a:r>
+              <a:rPr lang="en-US" dirty="0" err="1"/>
+              <a:t>realtime</a:t>
+            </a:r>
+            <a:r>
+              <a:rPr lang="en-US" dirty="0"/>
+              <a:t>)</a:t>
+            </a:r>
+          </a:p>
+          <a:p>
+            <a:r>
+              <a:rPr lang="en-US" dirty="0"/>
+              <a:t>No possibility of corrupting unrelated state</a:t>
+            </a:r>
+          </a:p>
+          <a:p>
             <a:endParaRPr lang="en-US" dirty="0"/>
-          </a:p>
-        </p:txBody>
-      </p:sp>
-      <p:sp>
-        <p:nvSpPr>
-          <p:cNvPr id="7" name="Rounded Rectangle 6"/>
-          <p:cNvSpPr/>
-          <p:nvPr/>
-        </p:nvSpPr>
-        <p:spPr>
-          <a:xfrm>
-            <a:off x="1143000" y="3676650"/>
-            <a:ext cx="2057400" cy="304800"/>
-          </a:xfrm>
-          <a:prstGeom prst="roundRect">
-            <a:avLst/>
-          </a:prstGeom>
-        </p:spPr>
-        <p:style>
-          <a:lnRef idx="1">
-            <a:schemeClr val="accent6"/>
-          </a:lnRef>
-          <a:fillRef idx="2">
-            <a:schemeClr val="accent6"/>
-          </a:fillRef>
-          <a:effectRef idx="1">
-            <a:schemeClr val="accent6"/>
-          </a:effectRef>
-          <a:fontRef idx="minor">
-            <a:schemeClr val="dk1"/>
-          </a:fontRef>
-        </p:style>
-        <p:txBody>
-          <a:bodyPr rtlCol="0" anchor="ctr"/>
-          <a:lstStyle/>
-          <a:p>
-            <a:pPr algn="ctr"/>
-            <a:r>
-              <a:rPr lang="en-US" dirty="0" smtClean="0"/>
-              <a:t>App1 ::8060/16</a:t>
-            </a:r>
-            <a:endParaRPr lang="en-US" dirty="0"/>
-          </a:p>
-        </p:txBody>
-      </p:sp>
-      <p:sp>
-        <p:nvSpPr>
-          <p:cNvPr id="8" name="Rounded Rectangle 7"/>
-          <p:cNvSpPr/>
-          <p:nvPr/>
-        </p:nvSpPr>
-        <p:spPr>
-          <a:xfrm>
-            <a:off x="1143000" y="4171950"/>
-            <a:ext cx="2057400" cy="304800"/>
-          </a:xfrm>
-          <a:prstGeom prst="roundRect">
-            <a:avLst/>
-          </a:prstGeom>
-        </p:spPr>
-        <p:style>
-          <a:lnRef idx="1">
-            <a:schemeClr val="accent6"/>
-          </a:lnRef>
-          <a:fillRef idx="2">
-            <a:schemeClr val="accent6"/>
-          </a:fillRef>
-          <a:effectRef idx="1">
-            <a:schemeClr val="accent6"/>
-          </a:effectRef>
-          <a:fontRef idx="minor">
-            <a:schemeClr val="dk1"/>
-          </a:fontRef>
-        </p:style>
-        <p:txBody>
-          <a:bodyPr rtlCol="0" anchor="ctr"/>
-          <a:lstStyle/>
-          <a:p>
-            <a:pPr algn="ctr"/>
-            <a:r>
-              <a:rPr lang="en-US" dirty="0" smtClean="0"/>
-              <a:t>App2 ::8061/16</a:t>
-            </a:r>
-            <a:endParaRPr lang="en-US" dirty="0"/>
-          </a:p>
-        </p:txBody>
-      </p:sp>
-      <p:cxnSp>
-        <p:nvCxnSpPr>
-          <p:cNvPr id="10" name="Elbow Connector 9"/>
-          <p:cNvCxnSpPr>
-            <a:stCxn id="5" idx="2"/>
-            <a:endCxn id="6" idx="1"/>
-          </p:cNvCxnSpPr>
-          <p:nvPr/>
-        </p:nvCxnSpPr>
-        <p:spPr>
-          <a:xfrm rot="5400000">
-            <a:off x="1200150" y="2971800"/>
-            <a:ext cx="304800" cy="419100"/>
-          </a:xfrm>
-          <a:prstGeom prst="bentConnector4">
-            <a:avLst>
-              <a:gd name="adj1" fmla="val 25000"/>
-              <a:gd name="adj2" fmla="val 154545"/>
-            </a:avLst>
-          </a:prstGeom>
-          <a:ln>
-            <a:tailEnd type="triangle"/>
-          </a:ln>
-        </p:spPr>
-        <p:style>
-          <a:lnRef idx="3">
-            <a:schemeClr val="accent4"/>
-          </a:lnRef>
-          <a:fillRef idx="0">
-            <a:schemeClr val="accent4"/>
-          </a:fillRef>
-          <a:effectRef idx="2">
-            <a:schemeClr val="accent4"/>
-          </a:effectRef>
-          <a:fontRef idx="minor">
-            <a:schemeClr val="tx1"/>
-          </a:fontRef>
-        </p:style>
-      </p:cxnSp>
-      <p:cxnSp>
-        <p:nvCxnSpPr>
-          <p:cNvPr id="12" name="Elbow Connector 11"/>
-          <p:cNvCxnSpPr>
-            <a:stCxn id="5" idx="2"/>
-            <a:endCxn id="7" idx="1"/>
-          </p:cNvCxnSpPr>
-          <p:nvPr/>
-        </p:nvCxnSpPr>
-        <p:spPr>
-          <a:xfrm rot="5400000">
-            <a:off x="952500" y="3219450"/>
-            <a:ext cx="800100" cy="419100"/>
-          </a:xfrm>
-          <a:prstGeom prst="bentConnector4">
-            <a:avLst>
-              <a:gd name="adj1" fmla="val 10360"/>
-              <a:gd name="adj2" fmla="val 154545"/>
-            </a:avLst>
-          </a:prstGeom>
-          <a:ln>
-            <a:tailEnd type="triangle"/>
-          </a:ln>
-        </p:spPr>
-        <p:style>
-          <a:lnRef idx="3">
-            <a:schemeClr val="accent4"/>
-          </a:lnRef>
-          <a:fillRef idx="0">
-            <a:schemeClr val="accent4"/>
-          </a:fillRef>
-          <a:effectRef idx="2">
-            <a:schemeClr val="accent4"/>
-          </a:effectRef>
-          <a:fontRef idx="minor">
-            <a:schemeClr val="tx1"/>
-          </a:fontRef>
-        </p:style>
-      </p:cxnSp>
-      <p:cxnSp>
-        <p:nvCxnSpPr>
-          <p:cNvPr id="16" name="Elbow Connector 15"/>
-          <p:cNvCxnSpPr>
-            <a:stCxn id="5" idx="2"/>
-            <a:endCxn id="8" idx="1"/>
-          </p:cNvCxnSpPr>
-          <p:nvPr/>
-        </p:nvCxnSpPr>
-        <p:spPr>
-          <a:xfrm rot="5400000">
-            <a:off x="704850" y="3467100"/>
-            <a:ext cx="1295400" cy="419100"/>
-          </a:xfrm>
-          <a:prstGeom prst="bentConnector4">
-            <a:avLst>
-              <a:gd name="adj1" fmla="val 6439"/>
-              <a:gd name="adj2" fmla="val 154545"/>
-            </a:avLst>
-          </a:prstGeom>
-          <a:ln>
-            <a:tailEnd type="triangle"/>
-          </a:ln>
-        </p:spPr>
-        <p:style>
-          <a:lnRef idx="3">
-            <a:schemeClr val="accent4"/>
-          </a:lnRef>
-          <a:fillRef idx="0">
-            <a:schemeClr val="accent4"/>
-          </a:fillRef>
-          <a:effectRef idx="2">
-            <a:schemeClr val="accent4"/>
-          </a:effectRef>
-          <a:fontRef idx="minor">
-            <a:schemeClr val="tx1"/>
-          </a:fontRef>
-        </p:style>
-      </p:cxnSp>
-      <p:sp>
-        <p:nvSpPr>
-          <p:cNvPr id="21" name="Rounded Rectangle 20"/>
-          <p:cNvSpPr/>
-          <p:nvPr/>
-        </p:nvSpPr>
-        <p:spPr>
-          <a:xfrm>
-            <a:off x="4475308" y="2645376"/>
-            <a:ext cx="2057400" cy="381000"/>
-          </a:xfrm>
-          <a:prstGeom prst="roundRect">
-            <a:avLst/>
-          </a:prstGeom>
-        </p:spPr>
-        <p:style>
-          <a:lnRef idx="1">
-            <a:schemeClr val="accent6"/>
-          </a:lnRef>
-          <a:fillRef idx="2">
-            <a:schemeClr val="accent6"/>
-          </a:fillRef>
-          <a:effectRef idx="1">
-            <a:schemeClr val="accent6"/>
-          </a:effectRef>
-          <a:fontRef idx="minor">
-            <a:schemeClr val="dk1"/>
-          </a:fontRef>
-        </p:style>
-        <p:txBody>
-          <a:bodyPr rtlCol="0" anchor="ctr"/>
-          <a:lstStyle/>
-          <a:p>
-            <a:pPr algn="ctr"/>
-            <a:r>
-              <a:rPr lang="en-US" dirty="0" smtClean="0"/>
-              <a:t>RAM ::8003/16</a:t>
-            </a:r>
-            <a:endParaRPr lang="en-US" dirty="0"/>
-          </a:p>
-        </p:txBody>
-      </p:sp>
-      <p:sp>
-        <p:nvSpPr>
-          <p:cNvPr id="22" name="Rounded Rectangle 21"/>
-          <p:cNvSpPr/>
-          <p:nvPr/>
-        </p:nvSpPr>
-        <p:spPr>
-          <a:xfrm>
-            <a:off x="4475308" y="3238500"/>
-            <a:ext cx="2057400" cy="381000"/>
-          </a:xfrm>
-          <a:prstGeom prst="roundRect">
-            <a:avLst/>
-          </a:prstGeom>
-        </p:spPr>
-        <p:style>
-          <a:lnRef idx="1">
-            <a:schemeClr val="accent6"/>
-          </a:lnRef>
-          <a:fillRef idx="2">
-            <a:schemeClr val="accent6"/>
-          </a:fillRef>
-          <a:effectRef idx="1">
-            <a:schemeClr val="accent6"/>
-          </a:effectRef>
-          <a:fontRef idx="minor">
-            <a:schemeClr val="dk1"/>
-          </a:fontRef>
-        </p:style>
-        <p:txBody>
-          <a:bodyPr rtlCol="0" anchor="ctr"/>
-          <a:lstStyle/>
-          <a:p>
-            <a:pPr algn="ctr"/>
-            <a:r>
-              <a:rPr lang="en-US" dirty="0" smtClean="0"/>
-              <a:t>Flash::8004/16</a:t>
-            </a:r>
-            <a:endParaRPr lang="en-US" dirty="0"/>
-          </a:p>
-        </p:txBody>
-      </p:sp>
-      <p:cxnSp>
-        <p:nvCxnSpPr>
-          <p:cNvPr id="24" name="Elbow Connector 23"/>
-          <p:cNvCxnSpPr>
-            <a:stCxn id="5" idx="3"/>
-            <a:endCxn id="21" idx="1"/>
-          </p:cNvCxnSpPr>
-          <p:nvPr/>
-        </p:nvCxnSpPr>
-        <p:spPr>
-          <a:xfrm flipV="1">
-            <a:off x="2590800" y="2835876"/>
-            <a:ext cx="1884508" cy="2574"/>
-          </a:xfrm>
-          <a:prstGeom prst="bentConnector3">
-            <a:avLst/>
-          </a:prstGeom>
-          <a:ln>
-            <a:tailEnd type="triangle"/>
-          </a:ln>
-        </p:spPr>
-        <p:style>
-          <a:lnRef idx="3">
-            <a:schemeClr val="accent4"/>
-          </a:lnRef>
-          <a:fillRef idx="0">
-            <a:schemeClr val="accent4"/>
-          </a:fillRef>
-          <a:effectRef idx="2">
-            <a:schemeClr val="accent4"/>
-          </a:effectRef>
-          <a:fontRef idx="minor">
-            <a:schemeClr val="tx1"/>
-          </a:fontRef>
-        </p:style>
-      </p:cxnSp>
-      <p:cxnSp>
-        <p:nvCxnSpPr>
-          <p:cNvPr id="25" name="Elbow Connector 24"/>
-          <p:cNvCxnSpPr>
-            <a:stCxn id="5" idx="3"/>
-            <a:endCxn id="22" idx="1"/>
-          </p:cNvCxnSpPr>
-          <p:nvPr/>
-        </p:nvCxnSpPr>
-        <p:spPr>
-          <a:xfrm>
-            <a:off x="2590800" y="2838450"/>
-            <a:ext cx="1884508" cy="590550"/>
-          </a:xfrm>
-          <a:prstGeom prst="bentConnector3">
-            <a:avLst>
-              <a:gd name="adj1" fmla="val 83769"/>
-            </a:avLst>
-          </a:prstGeom>
-          <a:ln>
-            <a:tailEnd type="triangle"/>
-          </a:ln>
-        </p:spPr>
-        <p:style>
-          <a:lnRef idx="3">
-            <a:schemeClr val="accent4"/>
-          </a:lnRef>
-          <a:fillRef idx="0">
-            <a:schemeClr val="accent4"/>
-          </a:fillRef>
-          <a:effectRef idx="2">
-            <a:schemeClr val="accent4"/>
-          </a:effectRef>
-          <a:fontRef idx="minor">
-            <a:schemeClr val="tx1"/>
-          </a:fontRef>
-        </p:style>
-      </p:cxnSp>
-      <p:sp>
-        <p:nvSpPr>
-          <p:cNvPr id="29" name="Rectangle 28"/>
-          <p:cNvSpPr/>
-          <p:nvPr/>
-        </p:nvSpPr>
-        <p:spPr>
-          <a:xfrm>
-            <a:off x="304800" y="2571750"/>
-            <a:ext cx="3276600" cy="2133600"/>
-          </a:xfrm>
-          <a:prstGeom prst="rect">
-            <a:avLst/>
-          </a:prstGeom>
-          <a:noFill/>
-          <a:ln>
-            <a:solidFill>
-              <a:schemeClr val="accent2">
-                <a:lumMod val="60000"/>
-                <a:lumOff val="40000"/>
-              </a:schemeClr>
-            </a:solidFill>
-            <a:prstDash val="sysDot"/>
-          </a:ln>
-        </p:spPr>
-        <p:style>
-          <a:lnRef idx="2">
-            <a:schemeClr val="accent1">
-              <a:shade val="50000"/>
-            </a:schemeClr>
-          </a:lnRef>
-          <a:fillRef idx="1">
-            <a:schemeClr val="accent1"/>
-          </a:fillRef>
-          <a:effectRef idx="0">
-            <a:schemeClr val="accent1"/>
-          </a:effectRef>
-          <a:fontRef idx="minor">
-            <a:schemeClr val="lt1"/>
-          </a:fontRef>
-        </p:style>
-        <p:txBody>
-          <a:bodyPr rtlCol="0" anchor="ctr"/>
-          <a:lstStyle/>
-          <a:p>
-            <a:pPr algn="ctr"/>
-            <a:endParaRPr lang="en-US"/>
           </a:p>
         </p:txBody>
       </p:sp>
     </p:spTree>
     <p:extLst>
       <p:ext uri="{BB962C8B-B14F-4D97-AF65-F5344CB8AC3E}">
-        <p14:creationId xmlns:p14="http://schemas.microsoft.com/office/powerpoint/2010/main" val="427899088"/>
+        <p14:creationId xmlns:p14="http://schemas.microsoft.com/office/powerpoint/2010/main" val="1362593794"/>
       </p:ext>
     </p:extLst>
   </p:cSld>

</xml_diff>